<commit_message>
add new triggers fix bank selection
</commit_message>
<xml_diff>
--- a/P300/TriggersBank/visual tirggers.pptx
+++ b/P300/TriggersBank/visual tirggers.pptx
@@ -14,6 +14,16 @@
     <p:sldId id="263" r:id="rId8"/>
     <p:sldId id="262" r:id="rId9"/>
     <p:sldId id="264" r:id="rId10"/>
+    <p:sldId id="265" r:id="rId11"/>
+    <p:sldId id="270" r:id="rId12"/>
+    <p:sldId id="268" r:id="rId13"/>
+    <p:sldId id="269" r:id="rId14"/>
+    <p:sldId id="267" r:id="rId15"/>
+    <p:sldId id="271" r:id="rId16"/>
+    <p:sldId id="275" r:id="rId17"/>
+    <p:sldId id="272" r:id="rId18"/>
+    <p:sldId id="273" r:id="rId19"/>
+    <p:sldId id="274" r:id="rId20"/>
   </p:sldIdLst>
   <p:sldSz cx="12192000" cy="6858000"/>
   <p:notesSz cx="6858000" cy="9144000"/>
@@ -112,6 +122,50 @@
       </a:defRPr>
     </a:lvl9pPr>
   </p:defaultTextStyle>
+  <p:extLst>
+    <p:ext uri="{521415D9-36F7-43E2-AB2F-B90AF26B5E84}">
+      <p14:sectionLst xmlns:p14="http://schemas.microsoft.com/office/powerpoint/2010/main">
+        <p14:section name="2 classes" id="{B1D218AE-EE56-4BFC-A219-E9D5E7712C38}">
+          <p14:sldIdLst>
+            <p14:sldId id="256"/>
+            <p14:sldId id="257"/>
+            <p14:sldId id="258"/>
+            <p14:sldId id="259"/>
+          </p14:sldIdLst>
+        </p14:section>
+        <p14:section name="3 classes" id="{520DAD1B-CF64-4C86-B38A-1D948092B84C}">
+          <p14:sldIdLst>
+            <p14:sldId id="260"/>
+            <p14:sldId id="261"/>
+            <p14:sldId id="263"/>
+            <p14:sldId id="262"/>
+            <p14:sldId id="264"/>
+          </p14:sldIdLst>
+        </p14:section>
+        <p14:section name="3 classes - center image" id="{487DF610-2CFB-4B72-BC66-1B44C2AD4C7A}">
+          <p14:sldIdLst>
+            <p14:sldId id="265"/>
+            <p14:sldId id="270"/>
+            <p14:sldId id="268"/>
+            <p14:sldId id="269"/>
+            <p14:sldId id="267"/>
+          </p14:sldIdLst>
+        </p14:section>
+        <p14:section name="3 classes whtie square" id="{93045461-8865-48BB-B255-1BF01E4D55EC}">
+          <p14:sldIdLst>
+            <p14:sldId id="271"/>
+            <p14:sldId id="275"/>
+            <p14:sldId id="272"/>
+            <p14:sldId id="273"/>
+            <p14:sldId id="274"/>
+          </p14:sldIdLst>
+        </p14:section>
+      </p14:sectionLst>
+    </p:ext>
+    <p:ext uri="{EFAFB233-063F-42B5-8137-9DF3F51BA10A}">
+      <p15:sldGuideLst xmlns:p15="http://schemas.microsoft.com/office/powerpoint/2012/main"/>
+    </p:ext>
+  </p:extLst>
 </p:presentation>
 </file>
 
@@ -264,7 +318,7 @@
           <a:p>
             <a:fld id="{7755E296-41C4-4F6E-A85E-738092B59B31}" type="datetimeFigureOut">
               <a:rPr lang="LID4096" smtClean="0"/>
-              <a:t>04/10/2022</a:t>
+              <a:t>05/03/2022</a:t>
             </a:fld>
             <a:endParaRPr lang="LID4096"/>
           </a:p>
@@ -464,7 +518,7 @@
           <a:p>
             <a:fld id="{7755E296-41C4-4F6E-A85E-738092B59B31}" type="datetimeFigureOut">
               <a:rPr lang="LID4096" smtClean="0"/>
-              <a:t>04/10/2022</a:t>
+              <a:t>05/03/2022</a:t>
             </a:fld>
             <a:endParaRPr lang="LID4096"/>
           </a:p>
@@ -674,7 +728,7 @@
           <a:p>
             <a:fld id="{7755E296-41C4-4F6E-A85E-738092B59B31}" type="datetimeFigureOut">
               <a:rPr lang="LID4096" smtClean="0"/>
-              <a:t>04/10/2022</a:t>
+              <a:t>05/03/2022</a:t>
             </a:fld>
             <a:endParaRPr lang="LID4096"/>
           </a:p>
@@ -874,7 +928,7 @@
           <a:p>
             <a:fld id="{7755E296-41C4-4F6E-A85E-738092B59B31}" type="datetimeFigureOut">
               <a:rPr lang="LID4096" smtClean="0"/>
-              <a:t>04/10/2022</a:t>
+              <a:t>05/03/2022</a:t>
             </a:fld>
             <a:endParaRPr lang="LID4096"/>
           </a:p>
@@ -1150,7 +1204,7 @@
           <a:p>
             <a:fld id="{7755E296-41C4-4F6E-A85E-738092B59B31}" type="datetimeFigureOut">
               <a:rPr lang="LID4096" smtClean="0"/>
-              <a:t>04/10/2022</a:t>
+              <a:t>05/03/2022</a:t>
             </a:fld>
             <a:endParaRPr lang="LID4096"/>
           </a:p>
@@ -1418,7 +1472,7 @@
           <a:p>
             <a:fld id="{7755E296-41C4-4F6E-A85E-738092B59B31}" type="datetimeFigureOut">
               <a:rPr lang="LID4096" smtClean="0"/>
-              <a:t>04/10/2022</a:t>
+              <a:t>05/03/2022</a:t>
             </a:fld>
             <a:endParaRPr lang="LID4096"/>
           </a:p>
@@ -1833,7 +1887,7 @@
           <a:p>
             <a:fld id="{7755E296-41C4-4F6E-A85E-738092B59B31}" type="datetimeFigureOut">
               <a:rPr lang="LID4096" smtClean="0"/>
-              <a:t>04/10/2022</a:t>
+              <a:t>05/03/2022</a:t>
             </a:fld>
             <a:endParaRPr lang="LID4096"/>
           </a:p>
@@ -1975,7 +2029,7 @@
           <a:p>
             <a:fld id="{7755E296-41C4-4F6E-A85E-738092B59B31}" type="datetimeFigureOut">
               <a:rPr lang="LID4096" smtClean="0"/>
-              <a:t>04/10/2022</a:t>
+              <a:t>05/03/2022</a:t>
             </a:fld>
             <a:endParaRPr lang="LID4096"/>
           </a:p>
@@ -2088,7 +2142,7 @@
           <a:p>
             <a:fld id="{7755E296-41C4-4F6E-A85E-738092B59B31}" type="datetimeFigureOut">
               <a:rPr lang="LID4096" smtClean="0"/>
-              <a:t>04/10/2022</a:t>
+              <a:t>05/03/2022</a:t>
             </a:fld>
             <a:endParaRPr lang="LID4096"/>
           </a:p>
@@ -2401,7 +2455,7 @@
           <a:p>
             <a:fld id="{7755E296-41C4-4F6E-A85E-738092B59B31}" type="datetimeFigureOut">
               <a:rPr lang="LID4096" smtClean="0"/>
-              <a:t>04/10/2022</a:t>
+              <a:t>05/03/2022</a:t>
             </a:fld>
             <a:endParaRPr lang="LID4096"/>
           </a:p>
@@ -2690,7 +2744,7 @@
           <a:p>
             <a:fld id="{7755E296-41C4-4F6E-A85E-738092B59B31}" type="datetimeFigureOut">
               <a:rPr lang="LID4096" smtClean="0"/>
-              <a:t>04/10/2022</a:t>
+              <a:t>05/03/2022</a:t>
             </a:fld>
             <a:endParaRPr lang="LID4096"/>
           </a:p>
@@ -2933,7 +2987,7 @@
           <a:p>
             <a:fld id="{7755E296-41C4-4F6E-A85E-738092B59B31}" type="datetimeFigureOut">
               <a:rPr lang="LID4096" smtClean="0"/>
-              <a:t>04/10/2022</a:t>
+              <a:t>05/03/2022</a:t>
             </a:fld>
             <a:endParaRPr lang="LID4096"/>
           </a:p>
@@ -3528,6 +3582,1889 @@
 </p:sld>
 </file>
 
+<file path=ppt/slides/slide10.xml><?xml version="1.0" encoding="utf-8"?>
+<p:sld xmlns:a="http://schemas.openxmlformats.org/drawingml/2006/main" xmlns:r="http://schemas.openxmlformats.org/officeDocument/2006/relationships" xmlns:p="http://schemas.openxmlformats.org/presentationml/2006/main">
+  <p:cSld>
+    <p:bg>
+      <p:bgPr>
+        <a:solidFill>
+          <a:schemeClr val="tx1"/>
+        </a:solidFill>
+        <a:effectLst/>
+      </p:bgPr>
+    </p:bg>
+    <p:spTree>
+      <p:nvGrpSpPr>
+        <p:cNvPr id="1" name=""/>
+        <p:cNvGrpSpPr/>
+        <p:nvPr/>
+      </p:nvGrpSpPr>
+      <p:grpSpPr>
+        <a:xfrm>
+          <a:off x="0" y="0"/>
+          <a:ext cx="0" cy="0"/>
+          <a:chOff x="0" y="0"/>
+          <a:chExt cx="0" cy="0"/>
+        </a:xfrm>
+      </p:grpSpPr>
+    </p:spTree>
+    <p:extLst>
+      <p:ext uri="{BB962C8B-B14F-4D97-AF65-F5344CB8AC3E}">
+        <p14:creationId xmlns:p14="http://schemas.microsoft.com/office/powerpoint/2010/main" val="3777900315"/>
+      </p:ext>
+    </p:extLst>
+  </p:cSld>
+  <p:clrMapOvr>
+    <a:masterClrMapping/>
+  </p:clrMapOvr>
+</p:sld>
+</file>
+
+<file path=ppt/slides/slide11.xml><?xml version="1.0" encoding="utf-8"?>
+<p:sld xmlns:a="http://schemas.openxmlformats.org/drawingml/2006/main" xmlns:r="http://schemas.openxmlformats.org/officeDocument/2006/relationships" xmlns:p="http://schemas.openxmlformats.org/presentationml/2006/main">
+  <p:cSld>
+    <p:bg>
+      <p:bgPr>
+        <a:solidFill>
+          <a:schemeClr val="tx1"/>
+        </a:solidFill>
+        <a:effectLst/>
+      </p:bgPr>
+    </p:bg>
+    <p:spTree>
+      <p:nvGrpSpPr>
+        <p:cNvPr id="1" name=""/>
+        <p:cNvGrpSpPr/>
+        <p:nvPr/>
+      </p:nvGrpSpPr>
+      <p:grpSpPr>
+        <a:xfrm>
+          <a:off x="0" y="0"/>
+          <a:ext cx="0" cy="0"/>
+          <a:chOff x="0" y="0"/>
+          <a:chExt cx="0" cy="0"/>
+        </a:xfrm>
+      </p:grpSpPr>
+      <p:sp>
+        <p:nvSpPr>
+          <p:cNvPr id="2" name="Multiplication Sign 1">
+            <a:extLst>
+              <a:ext uri="{FF2B5EF4-FFF2-40B4-BE49-F238E27FC236}">
+                <a16:creationId xmlns:a16="http://schemas.microsoft.com/office/drawing/2014/main" id="{A2172495-B8B0-44E4-9724-3BDCAD6A0EFC}"/>
+              </a:ext>
+            </a:extLst>
+          </p:cNvPr>
+          <p:cNvSpPr/>
+          <p:nvPr/>
+        </p:nvSpPr>
+        <p:spPr>
+          <a:xfrm>
+            <a:off x="4657276" y="2127112"/>
+            <a:ext cx="2877448" cy="2603776"/>
+          </a:xfrm>
+          <a:prstGeom prst="mathMultiply">
+            <a:avLst/>
+          </a:prstGeom>
+          <a:solidFill>
+            <a:schemeClr val="accent4">
+              <a:lumMod val="75000"/>
+            </a:schemeClr>
+          </a:solidFill>
+          <a:ln>
+            <a:solidFill>
+              <a:schemeClr val="accent4">
+                <a:lumMod val="75000"/>
+              </a:schemeClr>
+            </a:solidFill>
+          </a:ln>
+        </p:spPr>
+        <p:style>
+          <a:lnRef idx="2">
+            <a:schemeClr val="accent1">
+              <a:shade val="50000"/>
+            </a:schemeClr>
+          </a:lnRef>
+          <a:fillRef idx="1">
+            <a:schemeClr val="accent1"/>
+          </a:fillRef>
+          <a:effectRef idx="0">
+            <a:schemeClr val="accent1"/>
+          </a:effectRef>
+          <a:fontRef idx="minor">
+            <a:schemeClr val="lt1"/>
+          </a:fontRef>
+        </p:style>
+        <p:txBody>
+          <a:bodyPr rtlCol="0" anchor="ctr"/>
+          <a:lstStyle/>
+          <a:p>
+            <a:pPr algn="ctr"/>
+            <a:endParaRPr lang="LID4096"/>
+          </a:p>
+        </p:txBody>
+      </p:sp>
+    </p:spTree>
+    <p:extLst>
+      <p:ext uri="{BB962C8B-B14F-4D97-AF65-F5344CB8AC3E}">
+        <p14:creationId xmlns:p14="http://schemas.microsoft.com/office/powerpoint/2010/main" val="1255457173"/>
+      </p:ext>
+    </p:extLst>
+  </p:cSld>
+  <p:clrMapOvr>
+    <a:masterClrMapping/>
+  </p:clrMapOvr>
+</p:sld>
+</file>
+
+<file path=ppt/slides/slide12.xml><?xml version="1.0" encoding="utf-8"?>
+<p:sld xmlns:a="http://schemas.openxmlformats.org/drawingml/2006/main" xmlns:r="http://schemas.openxmlformats.org/officeDocument/2006/relationships" xmlns:p="http://schemas.openxmlformats.org/presentationml/2006/main">
+  <p:cSld>
+    <p:bg>
+      <p:bgPr>
+        <a:solidFill>
+          <a:schemeClr val="tx1"/>
+        </a:solidFill>
+        <a:effectLst/>
+      </p:bgPr>
+    </p:bg>
+    <p:spTree>
+      <p:nvGrpSpPr>
+        <p:cNvPr id="1" name=""/>
+        <p:cNvGrpSpPr/>
+        <p:nvPr/>
+      </p:nvGrpSpPr>
+      <p:grpSpPr>
+        <a:xfrm>
+          <a:off x="0" y="0"/>
+          <a:ext cx="0" cy="0"/>
+          <a:chOff x="0" y="0"/>
+          <a:chExt cx="0" cy="0"/>
+        </a:xfrm>
+      </p:grpSpPr>
+      <p:sp>
+        <p:nvSpPr>
+          <p:cNvPr id="2" name="Isosceles Triangle 1">
+            <a:extLst>
+              <a:ext uri="{FF2B5EF4-FFF2-40B4-BE49-F238E27FC236}">
+                <a16:creationId xmlns:a16="http://schemas.microsoft.com/office/drawing/2014/main" id="{C7D0851B-4B2F-48F3-A4D3-779436534ABA}"/>
+              </a:ext>
+            </a:extLst>
+          </p:cNvPr>
+          <p:cNvSpPr/>
+          <p:nvPr/>
+        </p:nvSpPr>
+        <p:spPr>
+          <a:xfrm>
+            <a:off x="5116901" y="2471467"/>
+            <a:ext cx="1958196" cy="1915063"/>
+          </a:xfrm>
+          <a:prstGeom prst="triangle">
+            <a:avLst/>
+          </a:prstGeom>
+          <a:solidFill>
+            <a:srgbClr val="FF0000"/>
+          </a:solidFill>
+          <a:ln>
+            <a:solidFill>
+              <a:srgbClr val="FF0000"/>
+            </a:solidFill>
+          </a:ln>
+        </p:spPr>
+        <p:style>
+          <a:lnRef idx="2">
+            <a:schemeClr val="accent1">
+              <a:shade val="50000"/>
+            </a:schemeClr>
+          </a:lnRef>
+          <a:fillRef idx="1">
+            <a:schemeClr val="accent1"/>
+          </a:fillRef>
+          <a:effectRef idx="0">
+            <a:schemeClr val="accent1"/>
+          </a:effectRef>
+          <a:fontRef idx="minor">
+            <a:schemeClr val="lt1"/>
+          </a:fontRef>
+        </p:style>
+        <p:txBody>
+          <a:bodyPr rtlCol="0" anchor="ctr"/>
+          <a:lstStyle/>
+          <a:p>
+            <a:pPr algn="ctr"/>
+            <a:endParaRPr lang="LID4096"/>
+          </a:p>
+        </p:txBody>
+      </p:sp>
+    </p:spTree>
+    <p:extLst>
+      <p:ext uri="{BB962C8B-B14F-4D97-AF65-F5344CB8AC3E}">
+        <p14:creationId xmlns:p14="http://schemas.microsoft.com/office/powerpoint/2010/main" val="4023284828"/>
+      </p:ext>
+    </p:extLst>
+  </p:cSld>
+  <p:clrMapOvr>
+    <a:masterClrMapping/>
+  </p:clrMapOvr>
+</p:sld>
+</file>
+
+<file path=ppt/slides/slide13.xml><?xml version="1.0" encoding="utf-8"?>
+<p:sld xmlns:a="http://schemas.openxmlformats.org/drawingml/2006/main" xmlns:r="http://schemas.openxmlformats.org/officeDocument/2006/relationships" xmlns:p="http://schemas.openxmlformats.org/presentationml/2006/main">
+  <p:cSld>
+    <p:bg>
+      <p:bgPr>
+        <a:solidFill>
+          <a:schemeClr val="tx1"/>
+        </a:solidFill>
+        <a:effectLst/>
+      </p:bgPr>
+    </p:bg>
+    <p:spTree>
+      <p:nvGrpSpPr>
+        <p:cNvPr id="1" name=""/>
+        <p:cNvGrpSpPr/>
+        <p:nvPr/>
+      </p:nvGrpSpPr>
+      <p:grpSpPr>
+        <a:xfrm>
+          <a:off x="0" y="0"/>
+          <a:ext cx="0" cy="0"/>
+          <a:chOff x="0" y="0"/>
+          <a:chExt cx="0" cy="0"/>
+        </a:xfrm>
+      </p:grpSpPr>
+      <p:sp>
+        <p:nvSpPr>
+          <p:cNvPr id="2" name="Rectangle 1">
+            <a:extLst>
+              <a:ext uri="{FF2B5EF4-FFF2-40B4-BE49-F238E27FC236}">
+                <a16:creationId xmlns:a16="http://schemas.microsoft.com/office/drawing/2014/main" id="{546956CE-3491-4DDC-A75D-0C9C3475D520}"/>
+              </a:ext>
+            </a:extLst>
+          </p:cNvPr>
+          <p:cNvSpPr/>
+          <p:nvPr/>
+        </p:nvSpPr>
+        <p:spPr>
+          <a:xfrm>
+            <a:off x="5037826" y="2471468"/>
+            <a:ext cx="2116347" cy="1915063"/>
+          </a:xfrm>
+          <a:prstGeom prst="rect">
+            <a:avLst/>
+          </a:prstGeom>
+        </p:spPr>
+        <p:style>
+          <a:lnRef idx="2">
+            <a:schemeClr val="accent1">
+              <a:shade val="50000"/>
+            </a:schemeClr>
+          </a:lnRef>
+          <a:fillRef idx="1">
+            <a:schemeClr val="accent1"/>
+          </a:fillRef>
+          <a:effectRef idx="0">
+            <a:schemeClr val="accent1"/>
+          </a:effectRef>
+          <a:fontRef idx="minor">
+            <a:schemeClr val="lt1"/>
+          </a:fontRef>
+        </p:style>
+        <p:txBody>
+          <a:bodyPr rtlCol="0" anchor="ctr"/>
+          <a:lstStyle/>
+          <a:p>
+            <a:pPr algn="ctr"/>
+            <a:endParaRPr lang="LID4096"/>
+          </a:p>
+        </p:txBody>
+      </p:sp>
+    </p:spTree>
+    <p:extLst>
+      <p:ext uri="{BB962C8B-B14F-4D97-AF65-F5344CB8AC3E}">
+        <p14:creationId xmlns:p14="http://schemas.microsoft.com/office/powerpoint/2010/main" val="2153271366"/>
+      </p:ext>
+    </p:extLst>
+  </p:cSld>
+  <p:clrMapOvr>
+    <a:masterClrMapping/>
+  </p:clrMapOvr>
+</p:sld>
+</file>
+
+<file path=ppt/slides/slide14.xml><?xml version="1.0" encoding="utf-8"?>
+<p:sld xmlns:a="http://schemas.openxmlformats.org/drawingml/2006/main" xmlns:r="http://schemas.openxmlformats.org/officeDocument/2006/relationships" xmlns:p="http://schemas.openxmlformats.org/presentationml/2006/main">
+  <p:cSld>
+    <p:bg>
+      <p:bgPr>
+        <a:solidFill>
+          <a:schemeClr val="tx1"/>
+        </a:solidFill>
+        <a:effectLst/>
+      </p:bgPr>
+    </p:bg>
+    <p:spTree>
+      <p:nvGrpSpPr>
+        <p:cNvPr id="1" name=""/>
+        <p:cNvGrpSpPr/>
+        <p:nvPr/>
+      </p:nvGrpSpPr>
+      <p:grpSpPr>
+        <a:xfrm>
+          <a:off x="0" y="0"/>
+          <a:ext cx="0" cy="0"/>
+          <a:chOff x="0" y="0"/>
+          <a:chExt cx="0" cy="0"/>
+        </a:xfrm>
+      </p:grpSpPr>
+      <p:sp>
+        <p:nvSpPr>
+          <p:cNvPr id="2" name="Oval 1">
+            <a:extLst>
+              <a:ext uri="{FF2B5EF4-FFF2-40B4-BE49-F238E27FC236}">
+                <a16:creationId xmlns:a16="http://schemas.microsoft.com/office/drawing/2014/main" id="{734D5A97-E475-4834-8523-EBFDA797EC3F}"/>
+              </a:ext>
+            </a:extLst>
+          </p:cNvPr>
+          <p:cNvSpPr/>
+          <p:nvPr/>
+        </p:nvSpPr>
+        <p:spPr>
+          <a:xfrm>
+            <a:off x="5138467" y="2471466"/>
+            <a:ext cx="1915063" cy="1915063"/>
+          </a:xfrm>
+          <a:prstGeom prst="ellipse">
+            <a:avLst/>
+          </a:prstGeom>
+          <a:solidFill>
+            <a:srgbClr val="00B050"/>
+          </a:solidFill>
+          <a:ln>
+            <a:solidFill>
+              <a:srgbClr val="00B050"/>
+            </a:solidFill>
+          </a:ln>
+        </p:spPr>
+        <p:style>
+          <a:lnRef idx="2">
+            <a:schemeClr val="accent1">
+              <a:shade val="50000"/>
+            </a:schemeClr>
+          </a:lnRef>
+          <a:fillRef idx="1">
+            <a:schemeClr val="accent1"/>
+          </a:fillRef>
+          <a:effectRef idx="0">
+            <a:schemeClr val="accent1"/>
+          </a:effectRef>
+          <a:fontRef idx="minor">
+            <a:schemeClr val="lt1"/>
+          </a:fontRef>
+        </p:style>
+        <p:txBody>
+          <a:bodyPr rtlCol="0" anchor="ctr"/>
+          <a:lstStyle/>
+          <a:p>
+            <a:pPr algn="ctr"/>
+            <a:endParaRPr lang="LID4096"/>
+          </a:p>
+        </p:txBody>
+      </p:sp>
+    </p:spTree>
+    <p:extLst>
+      <p:ext uri="{BB962C8B-B14F-4D97-AF65-F5344CB8AC3E}">
+        <p14:creationId xmlns:p14="http://schemas.microsoft.com/office/powerpoint/2010/main" val="3884630632"/>
+      </p:ext>
+    </p:extLst>
+  </p:cSld>
+  <p:clrMapOvr>
+    <a:masterClrMapping/>
+  </p:clrMapOvr>
+</p:sld>
+</file>
+
+<file path=ppt/slides/slide15.xml><?xml version="1.0" encoding="utf-8"?>
+<p:sld xmlns:a="http://schemas.openxmlformats.org/drawingml/2006/main" xmlns:r="http://schemas.openxmlformats.org/officeDocument/2006/relationships" xmlns:p="http://schemas.openxmlformats.org/presentationml/2006/main">
+  <p:cSld>
+    <p:bg>
+      <p:bgPr>
+        <a:solidFill>
+          <a:schemeClr val="tx1">
+            <a:lumMod val="85000"/>
+            <a:lumOff val="15000"/>
+          </a:schemeClr>
+        </a:solidFill>
+        <a:effectLst/>
+      </p:bgPr>
+    </p:bg>
+    <p:spTree>
+      <p:nvGrpSpPr>
+        <p:cNvPr id="1" name=""/>
+        <p:cNvGrpSpPr/>
+        <p:nvPr/>
+      </p:nvGrpSpPr>
+      <p:grpSpPr>
+        <a:xfrm>
+          <a:off x="0" y="0"/>
+          <a:ext cx="0" cy="0"/>
+          <a:chOff x="0" y="0"/>
+          <a:chExt cx="0" cy="0"/>
+        </a:xfrm>
+      </p:grpSpPr>
+      <p:sp>
+        <p:nvSpPr>
+          <p:cNvPr id="4" name="Isosceles Triangle 3">
+            <a:extLst>
+              <a:ext uri="{FF2B5EF4-FFF2-40B4-BE49-F238E27FC236}">
+                <a16:creationId xmlns:a16="http://schemas.microsoft.com/office/drawing/2014/main" id="{1E092BBE-7E09-4F3D-BC2D-905C49F1A534}"/>
+              </a:ext>
+            </a:extLst>
+          </p:cNvPr>
+          <p:cNvSpPr/>
+          <p:nvPr/>
+        </p:nvSpPr>
+        <p:spPr>
+          <a:xfrm>
+            <a:off x="1213447" y="621102"/>
+            <a:ext cx="1958196" cy="1915063"/>
+          </a:xfrm>
+          <a:prstGeom prst="triangle">
+            <a:avLst/>
+          </a:prstGeom>
+          <a:solidFill>
+            <a:schemeClr val="accent2"/>
+          </a:solidFill>
+          <a:ln>
+            <a:solidFill>
+              <a:schemeClr val="accent2"/>
+            </a:solidFill>
+          </a:ln>
+        </p:spPr>
+        <p:style>
+          <a:lnRef idx="2">
+            <a:schemeClr val="accent1">
+              <a:shade val="50000"/>
+            </a:schemeClr>
+          </a:lnRef>
+          <a:fillRef idx="1">
+            <a:schemeClr val="accent1"/>
+          </a:fillRef>
+          <a:effectRef idx="0">
+            <a:schemeClr val="accent1"/>
+          </a:effectRef>
+          <a:fontRef idx="minor">
+            <a:schemeClr val="lt1"/>
+          </a:fontRef>
+        </p:style>
+        <p:txBody>
+          <a:bodyPr rtlCol="0" anchor="ctr"/>
+          <a:lstStyle/>
+          <a:p>
+            <a:pPr algn="ctr"/>
+            <a:endParaRPr lang="LID4096"/>
+          </a:p>
+        </p:txBody>
+      </p:sp>
+      <p:sp>
+        <p:nvSpPr>
+          <p:cNvPr id="6" name="Rectangle 5">
+            <a:extLst>
+              <a:ext uri="{FF2B5EF4-FFF2-40B4-BE49-F238E27FC236}">
+                <a16:creationId xmlns:a16="http://schemas.microsoft.com/office/drawing/2014/main" id="{E25AC60D-B9D3-4B65-A41F-3A52DA7AF230}"/>
+              </a:ext>
+            </a:extLst>
+          </p:cNvPr>
+          <p:cNvSpPr/>
+          <p:nvPr/>
+        </p:nvSpPr>
+        <p:spPr>
+          <a:xfrm>
+            <a:off x="8123212" y="621100"/>
+            <a:ext cx="2116347" cy="1915063"/>
+          </a:xfrm>
+          <a:prstGeom prst="rect">
+            <a:avLst/>
+          </a:prstGeom>
+        </p:spPr>
+        <p:style>
+          <a:lnRef idx="2">
+            <a:schemeClr val="accent1">
+              <a:shade val="50000"/>
+            </a:schemeClr>
+          </a:lnRef>
+          <a:fillRef idx="1">
+            <a:schemeClr val="accent1"/>
+          </a:fillRef>
+          <a:effectRef idx="0">
+            <a:schemeClr val="accent1"/>
+          </a:effectRef>
+          <a:fontRef idx="minor">
+            <a:schemeClr val="lt1"/>
+          </a:fontRef>
+        </p:style>
+        <p:txBody>
+          <a:bodyPr rtlCol="0" anchor="ctr"/>
+          <a:lstStyle/>
+          <a:p>
+            <a:pPr algn="ctr"/>
+            <a:endParaRPr lang="LID4096"/>
+          </a:p>
+        </p:txBody>
+      </p:sp>
+      <p:sp>
+        <p:nvSpPr>
+          <p:cNvPr id="7" name="Oval 6">
+            <a:extLst>
+              <a:ext uri="{FF2B5EF4-FFF2-40B4-BE49-F238E27FC236}">
+                <a16:creationId xmlns:a16="http://schemas.microsoft.com/office/drawing/2014/main" id="{7F8D11B8-FA0D-471C-9F07-CF11310F081C}"/>
+              </a:ext>
+            </a:extLst>
+          </p:cNvPr>
+          <p:cNvSpPr/>
+          <p:nvPr/>
+        </p:nvSpPr>
+        <p:spPr>
+          <a:xfrm>
+            <a:off x="1213447" y="4321835"/>
+            <a:ext cx="1915063" cy="1915063"/>
+          </a:xfrm>
+          <a:prstGeom prst="ellipse">
+            <a:avLst/>
+          </a:prstGeom>
+          <a:solidFill>
+            <a:srgbClr val="00B050"/>
+          </a:solidFill>
+          <a:ln>
+            <a:solidFill>
+              <a:srgbClr val="00B050"/>
+            </a:solidFill>
+          </a:ln>
+        </p:spPr>
+        <p:style>
+          <a:lnRef idx="2">
+            <a:schemeClr val="accent1">
+              <a:shade val="50000"/>
+            </a:schemeClr>
+          </a:lnRef>
+          <a:fillRef idx="1">
+            <a:schemeClr val="accent1"/>
+          </a:fillRef>
+          <a:effectRef idx="0">
+            <a:schemeClr val="accent1"/>
+          </a:effectRef>
+          <a:fontRef idx="minor">
+            <a:schemeClr val="lt1"/>
+          </a:fontRef>
+        </p:style>
+        <p:txBody>
+          <a:bodyPr rtlCol="0" anchor="ctr"/>
+          <a:lstStyle/>
+          <a:p>
+            <a:pPr algn="ctr"/>
+            <a:endParaRPr lang="LID4096"/>
+          </a:p>
+        </p:txBody>
+      </p:sp>
+      <p:sp>
+        <p:nvSpPr>
+          <p:cNvPr id="5" name="Multiplication Sign 4">
+            <a:extLst>
+              <a:ext uri="{FF2B5EF4-FFF2-40B4-BE49-F238E27FC236}">
+                <a16:creationId xmlns:a16="http://schemas.microsoft.com/office/drawing/2014/main" id="{45B3824D-CFD6-4774-80F2-893C8D831922}"/>
+              </a:ext>
+            </a:extLst>
+          </p:cNvPr>
+          <p:cNvSpPr/>
+          <p:nvPr/>
+        </p:nvSpPr>
+        <p:spPr>
+          <a:xfrm>
+            <a:off x="8123212" y="4321834"/>
+            <a:ext cx="2116347" cy="1915063"/>
+          </a:xfrm>
+          <a:prstGeom prst="mathMultiply">
+            <a:avLst/>
+          </a:prstGeom>
+          <a:solidFill>
+            <a:schemeClr val="accent4">
+              <a:lumMod val="75000"/>
+            </a:schemeClr>
+          </a:solidFill>
+          <a:ln>
+            <a:solidFill>
+              <a:schemeClr val="accent4">
+                <a:lumMod val="75000"/>
+              </a:schemeClr>
+            </a:solidFill>
+          </a:ln>
+        </p:spPr>
+        <p:style>
+          <a:lnRef idx="2">
+            <a:schemeClr val="accent1">
+              <a:shade val="50000"/>
+            </a:schemeClr>
+          </a:lnRef>
+          <a:fillRef idx="1">
+            <a:schemeClr val="accent1"/>
+          </a:fillRef>
+          <a:effectRef idx="0">
+            <a:schemeClr val="accent1"/>
+          </a:effectRef>
+          <a:fontRef idx="minor">
+            <a:schemeClr val="lt1"/>
+          </a:fontRef>
+        </p:style>
+        <p:txBody>
+          <a:bodyPr rtlCol="0" anchor="ctr"/>
+          <a:lstStyle/>
+          <a:p>
+            <a:pPr algn="ctr"/>
+            <a:endParaRPr lang="LID4096"/>
+          </a:p>
+        </p:txBody>
+      </p:sp>
+    </p:spTree>
+    <p:extLst>
+      <p:ext uri="{BB962C8B-B14F-4D97-AF65-F5344CB8AC3E}">
+        <p14:creationId xmlns:p14="http://schemas.microsoft.com/office/powerpoint/2010/main" val="2847089093"/>
+      </p:ext>
+    </p:extLst>
+  </p:cSld>
+  <p:clrMapOvr>
+    <a:masterClrMapping/>
+  </p:clrMapOvr>
+</p:sld>
+</file>
+
+<file path=ppt/slides/slide16.xml><?xml version="1.0" encoding="utf-8"?>
+<p:sld xmlns:a="http://schemas.openxmlformats.org/drawingml/2006/main" xmlns:r="http://schemas.openxmlformats.org/officeDocument/2006/relationships" xmlns:p="http://schemas.openxmlformats.org/presentationml/2006/main">
+  <p:cSld>
+    <p:bg>
+      <p:bgPr>
+        <a:solidFill>
+          <a:schemeClr val="tx1">
+            <a:lumMod val="85000"/>
+            <a:lumOff val="15000"/>
+          </a:schemeClr>
+        </a:solidFill>
+        <a:effectLst/>
+      </p:bgPr>
+    </p:bg>
+    <p:spTree>
+      <p:nvGrpSpPr>
+        <p:cNvPr id="1" name=""/>
+        <p:cNvGrpSpPr/>
+        <p:nvPr/>
+      </p:nvGrpSpPr>
+      <p:grpSpPr>
+        <a:xfrm>
+          <a:off x="0" y="0"/>
+          <a:ext cx="0" cy="0"/>
+          <a:chOff x="0" y="0"/>
+          <a:chExt cx="0" cy="0"/>
+        </a:xfrm>
+      </p:grpSpPr>
+      <p:sp>
+        <p:nvSpPr>
+          <p:cNvPr id="6" name="Rectangle 5">
+            <a:extLst>
+              <a:ext uri="{FF2B5EF4-FFF2-40B4-BE49-F238E27FC236}">
+                <a16:creationId xmlns:a16="http://schemas.microsoft.com/office/drawing/2014/main" id="{E25AC60D-B9D3-4B65-A41F-3A52DA7AF230}"/>
+              </a:ext>
+            </a:extLst>
+          </p:cNvPr>
+          <p:cNvSpPr/>
+          <p:nvPr/>
+        </p:nvSpPr>
+        <p:spPr>
+          <a:xfrm>
+            <a:off x="8123212" y="621100"/>
+            <a:ext cx="2116347" cy="1915063"/>
+          </a:xfrm>
+          <a:prstGeom prst="rect">
+            <a:avLst/>
+          </a:prstGeom>
+        </p:spPr>
+        <p:style>
+          <a:lnRef idx="2">
+            <a:schemeClr val="accent1">
+              <a:shade val="50000"/>
+            </a:schemeClr>
+          </a:lnRef>
+          <a:fillRef idx="1">
+            <a:schemeClr val="accent1"/>
+          </a:fillRef>
+          <a:effectRef idx="0">
+            <a:schemeClr val="accent1"/>
+          </a:effectRef>
+          <a:fontRef idx="minor">
+            <a:schemeClr val="lt1"/>
+          </a:fontRef>
+        </p:style>
+        <p:txBody>
+          <a:bodyPr rtlCol="0" anchor="ctr"/>
+          <a:lstStyle/>
+          <a:p>
+            <a:pPr algn="ctr"/>
+            <a:endParaRPr lang="LID4096"/>
+          </a:p>
+        </p:txBody>
+      </p:sp>
+      <p:sp>
+        <p:nvSpPr>
+          <p:cNvPr id="7" name="Oval 6">
+            <a:extLst>
+              <a:ext uri="{FF2B5EF4-FFF2-40B4-BE49-F238E27FC236}">
+                <a16:creationId xmlns:a16="http://schemas.microsoft.com/office/drawing/2014/main" id="{7F8D11B8-FA0D-471C-9F07-CF11310F081C}"/>
+              </a:ext>
+            </a:extLst>
+          </p:cNvPr>
+          <p:cNvSpPr/>
+          <p:nvPr/>
+        </p:nvSpPr>
+        <p:spPr>
+          <a:xfrm>
+            <a:off x="1213447" y="4321835"/>
+            <a:ext cx="1915063" cy="1915063"/>
+          </a:xfrm>
+          <a:prstGeom prst="ellipse">
+            <a:avLst/>
+          </a:prstGeom>
+          <a:solidFill>
+            <a:srgbClr val="00B050"/>
+          </a:solidFill>
+          <a:ln>
+            <a:solidFill>
+              <a:srgbClr val="00B050"/>
+            </a:solidFill>
+          </a:ln>
+        </p:spPr>
+        <p:style>
+          <a:lnRef idx="2">
+            <a:schemeClr val="accent1">
+              <a:shade val="50000"/>
+            </a:schemeClr>
+          </a:lnRef>
+          <a:fillRef idx="1">
+            <a:schemeClr val="accent1"/>
+          </a:fillRef>
+          <a:effectRef idx="0">
+            <a:schemeClr val="accent1"/>
+          </a:effectRef>
+          <a:fontRef idx="minor">
+            <a:schemeClr val="lt1"/>
+          </a:fontRef>
+        </p:style>
+        <p:txBody>
+          <a:bodyPr rtlCol="0" anchor="ctr"/>
+          <a:lstStyle/>
+          <a:p>
+            <a:pPr algn="ctr"/>
+            <a:endParaRPr lang="LID4096"/>
+          </a:p>
+        </p:txBody>
+      </p:sp>
+      <p:sp>
+        <p:nvSpPr>
+          <p:cNvPr id="5" name="Multiplication Sign 4">
+            <a:extLst>
+              <a:ext uri="{FF2B5EF4-FFF2-40B4-BE49-F238E27FC236}">
+                <a16:creationId xmlns:a16="http://schemas.microsoft.com/office/drawing/2014/main" id="{45B3824D-CFD6-4774-80F2-893C8D831922}"/>
+              </a:ext>
+            </a:extLst>
+          </p:cNvPr>
+          <p:cNvSpPr/>
+          <p:nvPr/>
+        </p:nvSpPr>
+        <p:spPr>
+          <a:xfrm>
+            <a:off x="8123212" y="4321834"/>
+            <a:ext cx="2116347" cy="1915063"/>
+          </a:xfrm>
+          <a:prstGeom prst="mathMultiply">
+            <a:avLst/>
+          </a:prstGeom>
+          <a:solidFill>
+            <a:schemeClr val="accent4">
+              <a:lumMod val="75000"/>
+            </a:schemeClr>
+          </a:solidFill>
+          <a:ln>
+            <a:solidFill>
+              <a:schemeClr val="accent4">
+                <a:lumMod val="75000"/>
+              </a:schemeClr>
+            </a:solidFill>
+          </a:ln>
+        </p:spPr>
+        <p:style>
+          <a:lnRef idx="2">
+            <a:schemeClr val="accent1">
+              <a:shade val="50000"/>
+            </a:schemeClr>
+          </a:lnRef>
+          <a:fillRef idx="1">
+            <a:schemeClr val="accent1"/>
+          </a:fillRef>
+          <a:effectRef idx="0">
+            <a:schemeClr val="accent1"/>
+          </a:effectRef>
+          <a:fontRef idx="minor">
+            <a:schemeClr val="lt1"/>
+          </a:fontRef>
+        </p:style>
+        <p:txBody>
+          <a:bodyPr rtlCol="0" anchor="ctr"/>
+          <a:lstStyle/>
+          <a:p>
+            <a:pPr algn="ctr"/>
+            <a:endParaRPr lang="LID4096"/>
+          </a:p>
+        </p:txBody>
+      </p:sp>
+      <p:sp>
+        <p:nvSpPr>
+          <p:cNvPr id="10" name="Isosceles Triangle 9">
+            <a:extLst>
+              <a:ext uri="{FF2B5EF4-FFF2-40B4-BE49-F238E27FC236}">
+                <a16:creationId xmlns:a16="http://schemas.microsoft.com/office/drawing/2014/main" id="{6EF814DD-E5E5-42CB-A597-AF6EED1CFC23}"/>
+              </a:ext>
+            </a:extLst>
+          </p:cNvPr>
+          <p:cNvSpPr/>
+          <p:nvPr/>
+        </p:nvSpPr>
+        <p:spPr>
+          <a:xfrm>
+            <a:off x="1213447" y="621102"/>
+            <a:ext cx="1958196" cy="1915063"/>
+          </a:xfrm>
+          <a:prstGeom prst="triangle">
+            <a:avLst/>
+          </a:prstGeom>
+          <a:solidFill>
+            <a:schemeClr val="accent2"/>
+          </a:solidFill>
+          <a:ln>
+            <a:solidFill>
+              <a:schemeClr val="accent2"/>
+            </a:solidFill>
+          </a:ln>
+        </p:spPr>
+        <p:style>
+          <a:lnRef idx="2">
+            <a:schemeClr val="accent1">
+              <a:shade val="50000"/>
+            </a:schemeClr>
+          </a:lnRef>
+          <a:fillRef idx="1">
+            <a:schemeClr val="accent1"/>
+          </a:fillRef>
+          <a:effectRef idx="0">
+            <a:schemeClr val="accent1"/>
+          </a:effectRef>
+          <a:fontRef idx="minor">
+            <a:schemeClr val="lt1"/>
+          </a:fontRef>
+        </p:style>
+        <p:txBody>
+          <a:bodyPr rtlCol="0" anchor="ctr"/>
+          <a:lstStyle/>
+          <a:p>
+            <a:pPr algn="ctr"/>
+            <a:endParaRPr lang="LID4096"/>
+          </a:p>
+        </p:txBody>
+      </p:sp>
+      <p:sp>
+        <p:nvSpPr>
+          <p:cNvPr id="11" name="Rectangle 10">
+            <a:extLst>
+              <a:ext uri="{FF2B5EF4-FFF2-40B4-BE49-F238E27FC236}">
+                <a16:creationId xmlns:a16="http://schemas.microsoft.com/office/drawing/2014/main" id="{ACEAE501-D912-47F3-864C-9D0DC7B33F00}"/>
+              </a:ext>
+            </a:extLst>
+          </p:cNvPr>
+          <p:cNvSpPr/>
+          <p:nvPr/>
+        </p:nvSpPr>
+        <p:spPr>
+          <a:xfrm>
+            <a:off x="7546680" y="3872405"/>
+            <a:ext cx="3269410" cy="2813919"/>
+          </a:xfrm>
+          <a:prstGeom prst="rect">
+            <a:avLst/>
+          </a:prstGeom>
+          <a:solidFill>
+            <a:schemeClr val="bg1"/>
+          </a:solidFill>
+          <a:ln w="57150">
+            <a:solidFill>
+              <a:srgbClr val="FF0000"/>
+            </a:solidFill>
+          </a:ln>
+        </p:spPr>
+        <p:style>
+          <a:lnRef idx="2">
+            <a:schemeClr val="accent1">
+              <a:shade val="50000"/>
+            </a:schemeClr>
+          </a:lnRef>
+          <a:fillRef idx="1">
+            <a:schemeClr val="accent1"/>
+          </a:fillRef>
+          <a:effectRef idx="0">
+            <a:schemeClr val="accent1"/>
+          </a:effectRef>
+          <a:fontRef idx="minor">
+            <a:schemeClr val="lt1"/>
+          </a:fontRef>
+        </p:style>
+        <p:txBody>
+          <a:bodyPr rtlCol="0" anchor="ctr"/>
+          <a:lstStyle/>
+          <a:p>
+            <a:pPr algn="ctr"/>
+            <a:endParaRPr lang="LID4096"/>
+          </a:p>
+        </p:txBody>
+      </p:sp>
+    </p:spTree>
+    <p:extLst>
+      <p:ext uri="{BB962C8B-B14F-4D97-AF65-F5344CB8AC3E}">
+        <p14:creationId xmlns:p14="http://schemas.microsoft.com/office/powerpoint/2010/main" val="3657937282"/>
+      </p:ext>
+    </p:extLst>
+  </p:cSld>
+  <p:clrMapOvr>
+    <a:masterClrMapping/>
+  </p:clrMapOvr>
+</p:sld>
+</file>
+
+<file path=ppt/slides/slide17.xml><?xml version="1.0" encoding="utf-8"?>
+<p:sld xmlns:a="http://schemas.openxmlformats.org/drawingml/2006/main" xmlns:r="http://schemas.openxmlformats.org/officeDocument/2006/relationships" xmlns:p="http://schemas.openxmlformats.org/presentationml/2006/main">
+  <p:cSld>
+    <p:bg>
+      <p:bgPr>
+        <a:solidFill>
+          <a:schemeClr val="tx1">
+            <a:lumMod val="85000"/>
+            <a:lumOff val="15000"/>
+          </a:schemeClr>
+        </a:solidFill>
+        <a:effectLst/>
+      </p:bgPr>
+    </p:bg>
+    <p:spTree>
+      <p:nvGrpSpPr>
+        <p:cNvPr id="1" name=""/>
+        <p:cNvGrpSpPr/>
+        <p:nvPr/>
+      </p:nvGrpSpPr>
+      <p:grpSpPr>
+        <a:xfrm>
+          <a:off x="0" y="0"/>
+          <a:ext cx="0" cy="0"/>
+          <a:chOff x="0" y="0"/>
+          <a:chExt cx="0" cy="0"/>
+        </a:xfrm>
+      </p:grpSpPr>
+      <p:sp>
+        <p:nvSpPr>
+          <p:cNvPr id="4" name="Isosceles Triangle 3">
+            <a:extLst>
+              <a:ext uri="{FF2B5EF4-FFF2-40B4-BE49-F238E27FC236}">
+                <a16:creationId xmlns:a16="http://schemas.microsoft.com/office/drawing/2014/main" id="{1E092BBE-7E09-4F3D-BC2D-905C49F1A534}"/>
+              </a:ext>
+            </a:extLst>
+          </p:cNvPr>
+          <p:cNvSpPr/>
+          <p:nvPr/>
+        </p:nvSpPr>
+        <p:spPr>
+          <a:xfrm>
+            <a:off x="1213447" y="621102"/>
+            <a:ext cx="1958196" cy="1915063"/>
+          </a:xfrm>
+          <a:prstGeom prst="triangle">
+            <a:avLst/>
+          </a:prstGeom>
+          <a:solidFill>
+            <a:srgbClr val="FF0000"/>
+          </a:solidFill>
+          <a:ln>
+            <a:solidFill>
+              <a:srgbClr val="FF0000"/>
+            </a:solidFill>
+          </a:ln>
+        </p:spPr>
+        <p:style>
+          <a:lnRef idx="2">
+            <a:schemeClr val="accent1">
+              <a:shade val="50000"/>
+            </a:schemeClr>
+          </a:lnRef>
+          <a:fillRef idx="1">
+            <a:schemeClr val="accent1"/>
+          </a:fillRef>
+          <a:effectRef idx="0">
+            <a:schemeClr val="accent1"/>
+          </a:effectRef>
+          <a:fontRef idx="minor">
+            <a:schemeClr val="lt1"/>
+          </a:fontRef>
+        </p:style>
+        <p:txBody>
+          <a:bodyPr rtlCol="0" anchor="ctr"/>
+          <a:lstStyle/>
+          <a:p>
+            <a:pPr algn="ctr"/>
+            <a:endParaRPr lang="LID4096"/>
+          </a:p>
+        </p:txBody>
+      </p:sp>
+      <p:sp>
+        <p:nvSpPr>
+          <p:cNvPr id="6" name="Rectangle 5">
+            <a:extLst>
+              <a:ext uri="{FF2B5EF4-FFF2-40B4-BE49-F238E27FC236}">
+                <a16:creationId xmlns:a16="http://schemas.microsoft.com/office/drawing/2014/main" id="{E25AC60D-B9D3-4B65-A41F-3A52DA7AF230}"/>
+              </a:ext>
+            </a:extLst>
+          </p:cNvPr>
+          <p:cNvSpPr/>
+          <p:nvPr/>
+        </p:nvSpPr>
+        <p:spPr>
+          <a:xfrm>
+            <a:off x="8123212" y="621100"/>
+            <a:ext cx="2116347" cy="1915063"/>
+          </a:xfrm>
+          <a:prstGeom prst="rect">
+            <a:avLst/>
+          </a:prstGeom>
+        </p:spPr>
+        <p:style>
+          <a:lnRef idx="2">
+            <a:schemeClr val="accent1">
+              <a:shade val="50000"/>
+            </a:schemeClr>
+          </a:lnRef>
+          <a:fillRef idx="1">
+            <a:schemeClr val="accent1"/>
+          </a:fillRef>
+          <a:effectRef idx="0">
+            <a:schemeClr val="accent1"/>
+          </a:effectRef>
+          <a:fontRef idx="minor">
+            <a:schemeClr val="lt1"/>
+          </a:fontRef>
+        </p:style>
+        <p:txBody>
+          <a:bodyPr rtlCol="0" anchor="ctr"/>
+          <a:lstStyle/>
+          <a:p>
+            <a:pPr algn="ctr"/>
+            <a:endParaRPr lang="LID4096"/>
+          </a:p>
+        </p:txBody>
+      </p:sp>
+      <p:sp>
+        <p:nvSpPr>
+          <p:cNvPr id="7" name="Oval 6">
+            <a:extLst>
+              <a:ext uri="{FF2B5EF4-FFF2-40B4-BE49-F238E27FC236}">
+                <a16:creationId xmlns:a16="http://schemas.microsoft.com/office/drawing/2014/main" id="{7F8D11B8-FA0D-471C-9F07-CF11310F081C}"/>
+              </a:ext>
+            </a:extLst>
+          </p:cNvPr>
+          <p:cNvSpPr/>
+          <p:nvPr/>
+        </p:nvSpPr>
+        <p:spPr>
+          <a:xfrm>
+            <a:off x="1213447" y="4321835"/>
+            <a:ext cx="1915063" cy="1915063"/>
+          </a:xfrm>
+          <a:prstGeom prst="ellipse">
+            <a:avLst/>
+          </a:prstGeom>
+          <a:solidFill>
+            <a:srgbClr val="00B050"/>
+          </a:solidFill>
+          <a:ln>
+            <a:solidFill>
+              <a:srgbClr val="00B050"/>
+            </a:solidFill>
+          </a:ln>
+        </p:spPr>
+        <p:style>
+          <a:lnRef idx="2">
+            <a:schemeClr val="accent1">
+              <a:shade val="50000"/>
+            </a:schemeClr>
+          </a:lnRef>
+          <a:fillRef idx="1">
+            <a:schemeClr val="accent1"/>
+          </a:fillRef>
+          <a:effectRef idx="0">
+            <a:schemeClr val="accent1"/>
+          </a:effectRef>
+          <a:fontRef idx="minor">
+            <a:schemeClr val="lt1"/>
+          </a:fontRef>
+        </p:style>
+        <p:txBody>
+          <a:bodyPr rtlCol="0" anchor="ctr"/>
+          <a:lstStyle/>
+          <a:p>
+            <a:pPr algn="ctr"/>
+            <a:endParaRPr lang="LID4096"/>
+          </a:p>
+        </p:txBody>
+      </p:sp>
+      <p:sp>
+        <p:nvSpPr>
+          <p:cNvPr id="5" name="Multiplication Sign 4">
+            <a:extLst>
+              <a:ext uri="{FF2B5EF4-FFF2-40B4-BE49-F238E27FC236}">
+                <a16:creationId xmlns:a16="http://schemas.microsoft.com/office/drawing/2014/main" id="{45B3824D-CFD6-4774-80F2-893C8D831922}"/>
+              </a:ext>
+            </a:extLst>
+          </p:cNvPr>
+          <p:cNvSpPr/>
+          <p:nvPr/>
+        </p:nvSpPr>
+        <p:spPr>
+          <a:xfrm>
+            <a:off x="8123212" y="4321834"/>
+            <a:ext cx="2116347" cy="1915063"/>
+          </a:xfrm>
+          <a:prstGeom prst="mathMultiply">
+            <a:avLst/>
+          </a:prstGeom>
+          <a:solidFill>
+            <a:schemeClr val="accent4">
+              <a:lumMod val="75000"/>
+            </a:schemeClr>
+          </a:solidFill>
+          <a:ln>
+            <a:solidFill>
+              <a:schemeClr val="accent4">
+                <a:lumMod val="75000"/>
+              </a:schemeClr>
+            </a:solidFill>
+          </a:ln>
+        </p:spPr>
+        <p:style>
+          <a:lnRef idx="2">
+            <a:schemeClr val="accent1">
+              <a:shade val="50000"/>
+            </a:schemeClr>
+          </a:lnRef>
+          <a:fillRef idx="1">
+            <a:schemeClr val="accent1"/>
+          </a:fillRef>
+          <a:effectRef idx="0">
+            <a:schemeClr val="accent1"/>
+          </a:effectRef>
+          <a:fontRef idx="minor">
+            <a:schemeClr val="lt1"/>
+          </a:fontRef>
+        </p:style>
+        <p:txBody>
+          <a:bodyPr rtlCol="0" anchor="ctr"/>
+          <a:lstStyle/>
+          <a:p>
+            <a:pPr algn="ctr"/>
+            <a:endParaRPr lang="LID4096"/>
+          </a:p>
+        </p:txBody>
+      </p:sp>
+      <p:sp>
+        <p:nvSpPr>
+          <p:cNvPr id="8" name="Rectangle 7">
+            <a:extLst>
+              <a:ext uri="{FF2B5EF4-FFF2-40B4-BE49-F238E27FC236}">
+                <a16:creationId xmlns:a16="http://schemas.microsoft.com/office/drawing/2014/main" id="{BB7BD4DF-BA1C-4036-A20E-3F021F5C47F8}"/>
+              </a:ext>
+            </a:extLst>
+          </p:cNvPr>
+          <p:cNvSpPr/>
+          <p:nvPr/>
+        </p:nvSpPr>
+        <p:spPr>
+          <a:xfrm>
+            <a:off x="640759" y="286253"/>
+            <a:ext cx="3269410" cy="2813919"/>
+          </a:xfrm>
+          <a:prstGeom prst="rect">
+            <a:avLst/>
+          </a:prstGeom>
+          <a:solidFill>
+            <a:schemeClr val="bg1"/>
+          </a:solidFill>
+          <a:ln w="57150">
+            <a:solidFill>
+              <a:srgbClr val="FF0000"/>
+            </a:solidFill>
+          </a:ln>
+        </p:spPr>
+        <p:style>
+          <a:lnRef idx="2">
+            <a:schemeClr val="accent1">
+              <a:shade val="50000"/>
+            </a:schemeClr>
+          </a:lnRef>
+          <a:fillRef idx="1">
+            <a:schemeClr val="accent1"/>
+          </a:fillRef>
+          <a:effectRef idx="0">
+            <a:schemeClr val="accent1"/>
+          </a:effectRef>
+          <a:fontRef idx="minor">
+            <a:schemeClr val="lt1"/>
+          </a:fontRef>
+        </p:style>
+        <p:txBody>
+          <a:bodyPr rtlCol="0" anchor="ctr"/>
+          <a:lstStyle/>
+          <a:p>
+            <a:pPr algn="ctr"/>
+            <a:endParaRPr lang="LID4096"/>
+          </a:p>
+        </p:txBody>
+      </p:sp>
+    </p:spTree>
+    <p:extLst>
+      <p:ext uri="{BB962C8B-B14F-4D97-AF65-F5344CB8AC3E}">
+        <p14:creationId xmlns:p14="http://schemas.microsoft.com/office/powerpoint/2010/main" val="2312232887"/>
+      </p:ext>
+    </p:extLst>
+  </p:cSld>
+  <p:clrMapOvr>
+    <a:masterClrMapping/>
+  </p:clrMapOvr>
+</p:sld>
+</file>
+
+<file path=ppt/slides/slide18.xml><?xml version="1.0" encoding="utf-8"?>
+<p:sld xmlns:a="http://schemas.openxmlformats.org/drawingml/2006/main" xmlns:r="http://schemas.openxmlformats.org/officeDocument/2006/relationships" xmlns:p="http://schemas.openxmlformats.org/presentationml/2006/main">
+  <p:cSld>
+    <p:bg>
+      <p:bgPr>
+        <a:solidFill>
+          <a:schemeClr val="tx1">
+            <a:lumMod val="85000"/>
+            <a:lumOff val="15000"/>
+          </a:schemeClr>
+        </a:solidFill>
+        <a:effectLst/>
+      </p:bgPr>
+    </p:bg>
+    <p:spTree>
+      <p:nvGrpSpPr>
+        <p:cNvPr id="1" name=""/>
+        <p:cNvGrpSpPr/>
+        <p:nvPr/>
+      </p:nvGrpSpPr>
+      <p:grpSpPr>
+        <a:xfrm>
+          <a:off x="0" y="0"/>
+          <a:ext cx="0" cy="0"/>
+          <a:chOff x="0" y="0"/>
+          <a:chExt cx="0" cy="0"/>
+        </a:xfrm>
+      </p:grpSpPr>
+      <p:sp>
+        <p:nvSpPr>
+          <p:cNvPr id="6" name="Rectangle 5">
+            <a:extLst>
+              <a:ext uri="{FF2B5EF4-FFF2-40B4-BE49-F238E27FC236}">
+                <a16:creationId xmlns:a16="http://schemas.microsoft.com/office/drawing/2014/main" id="{E25AC60D-B9D3-4B65-A41F-3A52DA7AF230}"/>
+              </a:ext>
+            </a:extLst>
+          </p:cNvPr>
+          <p:cNvSpPr/>
+          <p:nvPr/>
+        </p:nvSpPr>
+        <p:spPr>
+          <a:xfrm>
+            <a:off x="8123212" y="621100"/>
+            <a:ext cx="2116347" cy="1915063"/>
+          </a:xfrm>
+          <a:prstGeom prst="rect">
+            <a:avLst/>
+          </a:prstGeom>
+        </p:spPr>
+        <p:style>
+          <a:lnRef idx="2">
+            <a:schemeClr val="accent1">
+              <a:shade val="50000"/>
+            </a:schemeClr>
+          </a:lnRef>
+          <a:fillRef idx="1">
+            <a:schemeClr val="accent1"/>
+          </a:fillRef>
+          <a:effectRef idx="0">
+            <a:schemeClr val="accent1"/>
+          </a:effectRef>
+          <a:fontRef idx="minor">
+            <a:schemeClr val="lt1"/>
+          </a:fontRef>
+        </p:style>
+        <p:txBody>
+          <a:bodyPr rtlCol="0" anchor="ctr"/>
+          <a:lstStyle/>
+          <a:p>
+            <a:pPr algn="ctr"/>
+            <a:endParaRPr lang="LID4096"/>
+          </a:p>
+        </p:txBody>
+      </p:sp>
+      <p:sp>
+        <p:nvSpPr>
+          <p:cNvPr id="7" name="Oval 6">
+            <a:extLst>
+              <a:ext uri="{FF2B5EF4-FFF2-40B4-BE49-F238E27FC236}">
+                <a16:creationId xmlns:a16="http://schemas.microsoft.com/office/drawing/2014/main" id="{7F8D11B8-FA0D-471C-9F07-CF11310F081C}"/>
+              </a:ext>
+            </a:extLst>
+          </p:cNvPr>
+          <p:cNvSpPr/>
+          <p:nvPr/>
+        </p:nvSpPr>
+        <p:spPr>
+          <a:xfrm>
+            <a:off x="1213447" y="4321835"/>
+            <a:ext cx="1915063" cy="1915063"/>
+          </a:xfrm>
+          <a:prstGeom prst="ellipse">
+            <a:avLst/>
+          </a:prstGeom>
+          <a:solidFill>
+            <a:srgbClr val="00B050"/>
+          </a:solidFill>
+          <a:ln>
+            <a:solidFill>
+              <a:srgbClr val="00B050"/>
+            </a:solidFill>
+          </a:ln>
+        </p:spPr>
+        <p:style>
+          <a:lnRef idx="2">
+            <a:schemeClr val="accent1">
+              <a:shade val="50000"/>
+            </a:schemeClr>
+          </a:lnRef>
+          <a:fillRef idx="1">
+            <a:schemeClr val="accent1"/>
+          </a:fillRef>
+          <a:effectRef idx="0">
+            <a:schemeClr val="accent1"/>
+          </a:effectRef>
+          <a:fontRef idx="minor">
+            <a:schemeClr val="lt1"/>
+          </a:fontRef>
+        </p:style>
+        <p:txBody>
+          <a:bodyPr rtlCol="0" anchor="ctr"/>
+          <a:lstStyle/>
+          <a:p>
+            <a:pPr algn="ctr"/>
+            <a:endParaRPr lang="LID4096"/>
+          </a:p>
+        </p:txBody>
+      </p:sp>
+      <p:sp>
+        <p:nvSpPr>
+          <p:cNvPr id="5" name="Multiplication Sign 4">
+            <a:extLst>
+              <a:ext uri="{FF2B5EF4-FFF2-40B4-BE49-F238E27FC236}">
+                <a16:creationId xmlns:a16="http://schemas.microsoft.com/office/drawing/2014/main" id="{45B3824D-CFD6-4774-80F2-893C8D831922}"/>
+              </a:ext>
+            </a:extLst>
+          </p:cNvPr>
+          <p:cNvSpPr/>
+          <p:nvPr/>
+        </p:nvSpPr>
+        <p:spPr>
+          <a:xfrm>
+            <a:off x="8123212" y="4321834"/>
+            <a:ext cx="2116347" cy="1915063"/>
+          </a:xfrm>
+          <a:prstGeom prst="mathMultiply">
+            <a:avLst/>
+          </a:prstGeom>
+          <a:solidFill>
+            <a:schemeClr val="accent4">
+              <a:lumMod val="75000"/>
+            </a:schemeClr>
+          </a:solidFill>
+          <a:ln>
+            <a:solidFill>
+              <a:schemeClr val="accent4">
+                <a:lumMod val="75000"/>
+              </a:schemeClr>
+            </a:solidFill>
+          </a:ln>
+        </p:spPr>
+        <p:style>
+          <a:lnRef idx="2">
+            <a:schemeClr val="accent1">
+              <a:shade val="50000"/>
+            </a:schemeClr>
+          </a:lnRef>
+          <a:fillRef idx="1">
+            <a:schemeClr val="accent1"/>
+          </a:fillRef>
+          <a:effectRef idx="0">
+            <a:schemeClr val="accent1"/>
+          </a:effectRef>
+          <a:fontRef idx="minor">
+            <a:schemeClr val="lt1"/>
+          </a:fontRef>
+        </p:style>
+        <p:txBody>
+          <a:bodyPr rtlCol="0" anchor="ctr"/>
+          <a:lstStyle/>
+          <a:p>
+            <a:pPr algn="ctr"/>
+            <a:endParaRPr lang="LID4096"/>
+          </a:p>
+        </p:txBody>
+      </p:sp>
+      <p:sp>
+        <p:nvSpPr>
+          <p:cNvPr id="11" name="Isosceles Triangle 10">
+            <a:extLst>
+              <a:ext uri="{FF2B5EF4-FFF2-40B4-BE49-F238E27FC236}">
+                <a16:creationId xmlns:a16="http://schemas.microsoft.com/office/drawing/2014/main" id="{E99B6879-FA3C-4315-856A-05C3B16E3C75}"/>
+              </a:ext>
+            </a:extLst>
+          </p:cNvPr>
+          <p:cNvSpPr/>
+          <p:nvPr/>
+        </p:nvSpPr>
+        <p:spPr>
+          <a:xfrm>
+            <a:off x="1213447" y="621102"/>
+            <a:ext cx="1958196" cy="1915063"/>
+          </a:xfrm>
+          <a:prstGeom prst="triangle">
+            <a:avLst/>
+          </a:prstGeom>
+          <a:solidFill>
+            <a:schemeClr val="accent2"/>
+          </a:solidFill>
+          <a:ln>
+            <a:solidFill>
+              <a:schemeClr val="accent2"/>
+            </a:solidFill>
+          </a:ln>
+        </p:spPr>
+        <p:style>
+          <a:lnRef idx="2">
+            <a:schemeClr val="accent1">
+              <a:shade val="50000"/>
+            </a:schemeClr>
+          </a:lnRef>
+          <a:fillRef idx="1">
+            <a:schemeClr val="accent1"/>
+          </a:fillRef>
+          <a:effectRef idx="0">
+            <a:schemeClr val="accent1"/>
+          </a:effectRef>
+          <a:fontRef idx="minor">
+            <a:schemeClr val="lt1"/>
+          </a:fontRef>
+        </p:style>
+        <p:txBody>
+          <a:bodyPr rtlCol="0" anchor="ctr"/>
+          <a:lstStyle/>
+          <a:p>
+            <a:pPr algn="ctr"/>
+            <a:endParaRPr lang="LID4096"/>
+          </a:p>
+        </p:txBody>
+      </p:sp>
+      <p:sp>
+        <p:nvSpPr>
+          <p:cNvPr id="12" name="Rectangle 11">
+            <a:extLst>
+              <a:ext uri="{FF2B5EF4-FFF2-40B4-BE49-F238E27FC236}">
+                <a16:creationId xmlns:a16="http://schemas.microsoft.com/office/drawing/2014/main" id="{8F2F2424-D5BD-4B96-B5C7-E59A05791FBE}"/>
+              </a:ext>
+            </a:extLst>
+          </p:cNvPr>
+          <p:cNvSpPr/>
+          <p:nvPr/>
+        </p:nvSpPr>
+        <p:spPr>
+          <a:xfrm>
+            <a:off x="7546680" y="171671"/>
+            <a:ext cx="3269410" cy="2813919"/>
+          </a:xfrm>
+          <a:prstGeom prst="rect">
+            <a:avLst/>
+          </a:prstGeom>
+          <a:solidFill>
+            <a:schemeClr val="bg1"/>
+          </a:solidFill>
+          <a:ln w="57150">
+            <a:solidFill>
+              <a:srgbClr val="FF0000"/>
+            </a:solidFill>
+          </a:ln>
+        </p:spPr>
+        <p:style>
+          <a:lnRef idx="2">
+            <a:schemeClr val="accent1">
+              <a:shade val="50000"/>
+            </a:schemeClr>
+          </a:lnRef>
+          <a:fillRef idx="1">
+            <a:schemeClr val="accent1"/>
+          </a:fillRef>
+          <a:effectRef idx="0">
+            <a:schemeClr val="accent1"/>
+          </a:effectRef>
+          <a:fontRef idx="minor">
+            <a:schemeClr val="lt1"/>
+          </a:fontRef>
+        </p:style>
+        <p:txBody>
+          <a:bodyPr rtlCol="0" anchor="ctr"/>
+          <a:lstStyle/>
+          <a:p>
+            <a:pPr algn="ctr"/>
+            <a:endParaRPr lang="LID4096"/>
+          </a:p>
+        </p:txBody>
+      </p:sp>
+    </p:spTree>
+    <p:extLst>
+      <p:ext uri="{BB962C8B-B14F-4D97-AF65-F5344CB8AC3E}">
+        <p14:creationId xmlns:p14="http://schemas.microsoft.com/office/powerpoint/2010/main" val="442757598"/>
+      </p:ext>
+    </p:extLst>
+  </p:cSld>
+  <p:clrMapOvr>
+    <a:masterClrMapping/>
+  </p:clrMapOvr>
+</p:sld>
+</file>
+
+<file path=ppt/slides/slide19.xml><?xml version="1.0" encoding="utf-8"?>
+<p:sld xmlns:a="http://schemas.openxmlformats.org/drawingml/2006/main" xmlns:r="http://schemas.openxmlformats.org/officeDocument/2006/relationships" xmlns:p="http://schemas.openxmlformats.org/presentationml/2006/main">
+  <p:cSld>
+    <p:bg>
+      <p:bgPr>
+        <a:solidFill>
+          <a:schemeClr val="tx1">
+            <a:lumMod val="85000"/>
+            <a:lumOff val="15000"/>
+          </a:schemeClr>
+        </a:solidFill>
+        <a:effectLst/>
+      </p:bgPr>
+    </p:bg>
+    <p:spTree>
+      <p:nvGrpSpPr>
+        <p:cNvPr id="1" name=""/>
+        <p:cNvGrpSpPr/>
+        <p:nvPr/>
+      </p:nvGrpSpPr>
+      <p:grpSpPr>
+        <a:xfrm>
+          <a:off x="0" y="0"/>
+          <a:ext cx="0" cy="0"/>
+          <a:chOff x="0" y="0"/>
+          <a:chExt cx="0" cy="0"/>
+        </a:xfrm>
+      </p:grpSpPr>
+      <p:sp>
+        <p:nvSpPr>
+          <p:cNvPr id="6" name="Rectangle 5">
+            <a:extLst>
+              <a:ext uri="{FF2B5EF4-FFF2-40B4-BE49-F238E27FC236}">
+                <a16:creationId xmlns:a16="http://schemas.microsoft.com/office/drawing/2014/main" id="{E25AC60D-B9D3-4B65-A41F-3A52DA7AF230}"/>
+              </a:ext>
+            </a:extLst>
+          </p:cNvPr>
+          <p:cNvSpPr/>
+          <p:nvPr/>
+        </p:nvSpPr>
+        <p:spPr>
+          <a:xfrm>
+            <a:off x="8123212" y="621100"/>
+            <a:ext cx="2116347" cy="1915063"/>
+          </a:xfrm>
+          <a:prstGeom prst="rect">
+            <a:avLst/>
+          </a:prstGeom>
+        </p:spPr>
+        <p:style>
+          <a:lnRef idx="2">
+            <a:schemeClr val="accent1">
+              <a:shade val="50000"/>
+            </a:schemeClr>
+          </a:lnRef>
+          <a:fillRef idx="1">
+            <a:schemeClr val="accent1"/>
+          </a:fillRef>
+          <a:effectRef idx="0">
+            <a:schemeClr val="accent1"/>
+          </a:effectRef>
+          <a:fontRef idx="minor">
+            <a:schemeClr val="lt1"/>
+          </a:fontRef>
+        </p:style>
+        <p:txBody>
+          <a:bodyPr rtlCol="0" anchor="ctr"/>
+          <a:lstStyle/>
+          <a:p>
+            <a:pPr algn="ctr"/>
+            <a:endParaRPr lang="LID4096"/>
+          </a:p>
+        </p:txBody>
+      </p:sp>
+      <p:sp>
+        <p:nvSpPr>
+          <p:cNvPr id="7" name="Oval 6">
+            <a:extLst>
+              <a:ext uri="{FF2B5EF4-FFF2-40B4-BE49-F238E27FC236}">
+                <a16:creationId xmlns:a16="http://schemas.microsoft.com/office/drawing/2014/main" id="{7F8D11B8-FA0D-471C-9F07-CF11310F081C}"/>
+              </a:ext>
+            </a:extLst>
+          </p:cNvPr>
+          <p:cNvSpPr/>
+          <p:nvPr/>
+        </p:nvSpPr>
+        <p:spPr>
+          <a:xfrm>
+            <a:off x="1213447" y="4321835"/>
+            <a:ext cx="1915063" cy="1915063"/>
+          </a:xfrm>
+          <a:prstGeom prst="ellipse">
+            <a:avLst/>
+          </a:prstGeom>
+          <a:solidFill>
+            <a:srgbClr val="00B050"/>
+          </a:solidFill>
+          <a:ln>
+            <a:solidFill>
+              <a:srgbClr val="00B050"/>
+            </a:solidFill>
+          </a:ln>
+        </p:spPr>
+        <p:style>
+          <a:lnRef idx="2">
+            <a:schemeClr val="accent1">
+              <a:shade val="50000"/>
+            </a:schemeClr>
+          </a:lnRef>
+          <a:fillRef idx="1">
+            <a:schemeClr val="accent1"/>
+          </a:fillRef>
+          <a:effectRef idx="0">
+            <a:schemeClr val="accent1"/>
+          </a:effectRef>
+          <a:fontRef idx="minor">
+            <a:schemeClr val="lt1"/>
+          </a:fontRef>
+        </p:style>
+        <p:txBody>
+          <a:bodyPr rtlCol="0" anchor="ctr"/>
+          <a:lstStyle/>
+          <a:p>
+            <a:pPr algn="ctr"/>
+            <a:endParaRPr lang="LID4096"/>
+          </a:p>
+        </p:txBody>
+      </p:sp>
+      <p:sp>
+        <p:nvSpPr>
+          <p:cNvPr id="5" name="Multiplication Sign 4">
+            <a:extLst>
+              <a:ext uri="{FF2B5EF4-FFF2-40B4-BE49-F238E27FC236}">
+                <a16:creationId xmlns:a16="http://schemas.microsoft.com/office/drawing/2014/main" id="{45B3824D-CFD6-4774-80F2-893C8D831922}"/>
+              </a:ext>
+            </a:extLst>
+          </p:cNvPr>
+          <p:cNvSpPr/>
+          <p:nvPr/>
+        </p:nvSpPr>
+        <p:spPr>
+          <a:xfrm>
+            <a:off x="8123212" y="4321834"/>
+            <a:ext cx="2116347" cy="1915063"/>
+          </a:xfrm>
+          <a:prstGeom prst="mathMultiply">
+            <a:avLst/>
+          </a:prstGeom>
+          <a:solidFill>
+            <a:schemeClr val="accent4">
+              <a:lumMod val="75000"/>
+            </a:schemeClr>
+          </a:solidFill>
+          <a:ln>
+            <a:solidFill>
+              <a:schemeClr val="accent4">
+                <a:lumMod val="75000"/>
+              </a:schemeClr>
+            </a:solidFill>
+          </a:ln>
+        </p:spPr>
+        <p:style>
+          <a:lnRef idx="2">
+            <a:schemeClr val="accent1">
+              <a:shade val="50000"/>
+            </a:schemeClr>
+          </a:lnRef>
+          <a:fillRef idx="1">
+            <a:schemeClr val="accent1"/>
+          </a:fillRef>
+          <a:effectRef idx="0">
+            <a:schemeClr val="accent1"/>
+          </a:effectRef>
+          <a:fontRef idx="minor">
+            <a:schemeClr val="lt1"/>
+          </a:fontRef>
+        </p:style>
+        <p:txBody>
+          <a:bodyPr rtlCol="0" anchor="ctr"/>
+          <a:lstStyle/>
+          <a:p>
+            <a:pPr algn="ctr"/>
+            <a:endParaRPr lang="LID4096"/>
+          </a:p>
+        </p:txBody>
+      </p:sp>
+      <p:sp>
+        <p:nvSpPr>
+          <p:cNvPr id="10" name="Isosceles Triangle 9">
+            <a:extLst>
+              <a:ext uri="{FF2B5EF4-FFF2-40B4-BE49-F238E27FC236}">
+                <a16:creationId xmlns:a16="http://schemas.microsoft.com/office/drawing/2014/main" id="{DC35C4E7-0234-4C28-A897-45F9D81A3612}"/>
+              </a:ext>
+            </a:extLst>
+          </p:cNvPr>
+          <p:cNvSpPr/>
+          <p:nvPr/>
+        </p:nvSpPr>
+        <p:spPr>
+          <a:xfrm>
+            <a:off x="1213447" y="621102"/>
+            <a:ext cx="1958196" cy="1915063"/>
+          </a:xfrm>
+          <a:prstGeom prst="triangle">
+            <a:avLst/>
+          </a:prstGeom>
+          <a:solidFill>
+            <a:schemeClr val="accent2"/>
+          </a:solidFill>
+          <a:ln>
+            <a:solidFill>
+              <a:schemeClr val="accent2"/>
+            </a:solidFill>
+          </a:ln>
+        </p:spPr>
+        <p:style>
+          <a:lnRef idx="2">
+            <a:schemeClr val="accent1">
+              <a:shade val="50000"/>
+            </a:schemeClr>
+          </a:lnRef>
+          <a:fillRef idx="1">
+            <a:schemeClr val="accent1"/>
+          </a:fillRef>
+          <a:effectRef idx="0">
+            <a:schemeClr val="accent1"/>
+          </a:effectRef>
+          <a:fontRef idx="minor">
+            <a:schemeClr val="lt1"/>
+          </a:fontRef>
+        </p:style>
+        <p:txBody>
+          <a:bodyPr rtlCol="0" anchor="ctr"/>
+          <a:lstStyle/>
+          <a:p>
+            <a:pPr algn="ctr"/>
+            <a:endParaRPr lang="LID4096"/>
+          </a:p>
+        </p:txBody>
+      </p:sp>
+      <p:sp>
+        <p:nvSpPr>
+          <p:cNvPr id="11" name="Rectangle 10">
+            <a:extLst>
+              <a:ext uri="{FF2B5EF4-FFF2-40B4-BE49-F238E27FC236}">
+                <a16:creationId xmlns:a16="http://schemas.microsoft.com/office/drawing/2014/main" id="{0F285830-D8A9-474D-A07E-0045D2E0D791}"/>
+              </a:ext>
+            </a:extLst>
+          </p:cNvPr>
+          <p:cNvSpPr/>
+          <p:nvPr/>
+        </p:nvSpPr>
+        <p:spPr>
+          <a:xfrm>
+            <a:off x="557840" y="3726634"/>
+            <a:ext cx="3269410" cy="2813919"/>
+          </a:xfrm>
+          <a:prstGeom prst="rect">
+            <a:avLst/>
+          </a:prstGeom>
+          <a:solidFill>
+            <a:schemeClr val="bg1"/>
+          </a:solidFill>
+          <a:ln w="57150">
+            <a:solidFill>
+              <a:srgbClr val="FF0000"/>
+            </a:solidFill>
+          </a:ln>
+        </p:spPr>
+        <p:style>
+          <a:lnRef idx="2">
+            <a:schemeClr val="accent1">
+              <a:shade val="50000"/>
+            </a:schemeClr>
+          </a:lnRef>
+          <a:fillRef idx="1">
+            <a:schemeClr val="accent1"/>
+          </a:fillRef>
+          <a:effectRef idx="0">
+            <a:schemeClr val="accent1"/>
+          </a:effectRef>
+          <a:fontRef idx="minor">
+            <a:schemeClr val="lt1"/>
+          </a:fontRef>
+        </p:style>
+        <p:txBody>
+          <a:bodyPr rtlCol="0" anchor="ctr"/>
+          <a:lstStyle/>
+          <a:p>
+            <a:pPr algn="ctr"/>
+            <a:endParaRPr lang="LID4096"/>
+          </a:p>
+        </p:txBody>
+      </p:sp>
+    </p:spTree>
+    <p:extLst>
+      <p:ext uri="{BB962C8B-B14F-4D97-AF65-F5344CB8AC3E}">
+        <p14:creationId xmlns:p14="http://schemas.microsoft.com/office/powerpoint/2010/main" val="63292730"/>
+      </p:ext>
+    </p:extLst>
+  </p:cSld>
+  <p:clrMapOvr>
+    <a:masterClrMapping/>
+  </p:clrMapOvr>
+</p:sld>
+</file>
+
 <file path=ppt/slides/slide2.xml><?xml version="1.0" encoding="utf-8"?>
 <p:sld xmlns:a="http://schemas.openxmlformats.org/drawingml/2006/main" xmlns:r="http://schemas.openxmlformats.org/officeDocument/2006/relationships" xmlns:p="http://schemas.openxmlformats.org/presentationml/2006/main">
   <p:cSld>

</xml_diff>

<commit_message>
update white background triggers & small fixes
</commit_message>
<xml_diff>
--- a/P300/TriggersBank/visual tirggers.pptx
+++ b/P300/TriggersBank/visual tirggers.pptx
@@ -318,7 +318,7 @@
           <a:p>
             <a:fld id="{7755E296-41C4-4F6E-A85E-738092B59B31}" type="datetimeFigureOut">
               <a:rPr lang="LID4096" smtClean="0"/>
-              <a:t>05/03/2022</a:t>
+              <a:t>05/04/2022</a:t>
             </a:fld>
             <a:endParaRPr lang="LID4096"/>
           </a:p>
@@ -518,7 +518,7 @@
           <a:p>
             <a:fld id="{7755E296-41C4-4F6E-A85E-738092B59B31}" type="datetimeFigureOut">
               <a:rPr lang="LID4096" smtClean="0"/>
-              <a:t>05/03/2022</a:t>
+              <a:t>05/04/2022</a:t>
             </a:fld>
             <a:endParaRPr lang="LID4096"/>
           </a:p>
@@ -728,7 +728,7 @@
           <a:p>
             <a:fld id="{7755E296-41C4-4F6E-A85E-738092B59B31}" type="datetimeFigureOut">
               <a:rPr lang="LID4096" smtClean="0"/>
-              <a:t>05/03/2022</a:t>
+              <a:t>05/04/2022</a:t>
             </a:fld>
             <a:endParaRPr lang="LID4096"/>
           </a:p>
@@ -928,7 +928,7 @@
           <a:p>
             <a:fld id="{7755E296-41C4-4F6E-A85E-738092B59B31}" type="datetimeFigureOut">
               <a:rPr lang="LID4096" smtClean="0"/>
-              <a:t>05/03/2022</a:t>
+              <a:t>05/04/2022</a:t>
             </a:fld>
             <a:endParaRPr lang="LID4096"/>
           </a:p>
@@ -1204,7 +1204,7 @@
           <a:p>
             <a:fld id="{7755E296-41C4-4F6E-A85E-738092B59B31}" type="datetimeFigureOut">
               <a:rPr lang="LID4096" smtClean="0"/>
-              <a:t>05/03/2022</a:t>
+              <a:t>05/04/2022</a:t>
             </a:fld>
             <a:endParaRPr lang="LID4096"/>
           </a:p>
@@ -1472,7 +1472,7 @@
           <a:p>
             <a:fld id="{7755E296-41C4-4F6E-A85E-738092B59B31}" type="datetimeFigureOut">
               <a:rPr lang="LID4096" smtClean="0"/>
-              <a:t>05/03/2022</a:t>
+              <a:t>05/04/2022</a:t>
             </a:fld>
             <a:endParaRPr lang="LID4096"/>
           </a:p>
@@ -1887,7 +1887,7 @@
           <a:p>
             <a:fld id="{7755E296-41C4-4F6E-A85E-738092B59B31}" type="datetimeFigureOut">
               <a:rPr lang="LID4096" smtClean="0"/>
-              <a:t>05/03/2022</a:t>
+              <a:t>05/04/2022</a:t>
             </a:fld>
             <a:endParaRPr lang="LID4096"/>
           </a:p>
@@ -2029,7 +2029,7 @@
           <a:p>
             <a:fld id="{7755E296-41C4-4F6E-A85E-738092B59B31}" type="datetimeFigureOut">
               <a:rPr lang="LID4096" smtClean="0"/>
-              <a:t>05/03/2022</a:t>
+              <a:t>05/04/2022</a:t>
             </a:fld>
             <a:endParaRPr lang="LID4096"/>
           </a:p>
@@ -2142,7 +2142,7 @@
           <a:p>
             <a:fld id="{7755E296-41C4-4F6E-A85E-738092B59B31}" type="datetimeFigureOut">
               <a:rPr lang="LID4096" smtClean="0"/>
-              <a:t>05/03/2022</a:t>
+              <a:t>05/04/2022</a:t>
             </a:fld>
             <a:endParaRPr lang="LID4096"/>
           </a:p>
@@ -2455,7 +2455,7 @@
           <a:p>
             <a:fld id="{7755E296-41C4-4F6E-A85E-738092B59B31}" type="datetimeFigureOut">
               <a:rPr lang="LID4096" smtClean="0"/>
-              <a:t>05/03/2022</a:t>
+              <a:t>05/04/2022</a:t>
             </a:fld>
             <a:endParaRPr lang="LID4096"/>
           </a:p>
@@ -2744,7 +2744,7 @@
           <a:p>
             <a:fld id="{7755E296-41C4-4F6E-A85E-738092B59B31}" type="datetimeFigureOut">
               <a:rPr lang="LID4096" smtClean="0"/>
-              <a:t>05/03/2022</a:t>
+              <a:t>05/04/2022</a:t>
             </a:fld>
             <a:endParaRPr lang="LID4096"/>
           </a:p>
@@ -2987,7 +2987,7 @@
           <a:p>
             <a:fld id="{7755E296-41C4-4F6E-A85E-738092B59B31}" type="datetimeFigureOut">
               <a:rPr lang="LID4096" smtClean="0"/>
-              <a:t>05/03/2022</a:t>
+              <a:t>05/04/2022</a:t>
             </a:fld>
             <a:endParaRPr lang="LID4096"/>
           </a:p>
@@ -4267,6 +4267,60 @@
       </p:grpSpPr>
       <p:sp>
         <p:nvSpPr>
+          <p:cNvPr id="11" name="Rectangle 10">
+            <a:extLst>
+              <a:ext uri="{FF2B5EF4-FFF2-40B4-BE49-F238E27FC236}">
+                <a16:creationId xmlns:a16="http://schemas.microsoft.com/office/drawing/2014/main" id="{ACEAE501-D912-47F3-864C-9D0DC7B33F00}"/>
+              </a:ext>
+            </a:extLst>
+          </p:cNvPr>
+          <p:cNvSpPr/>
+          <p:nvPr/>
+        </p:nvSpPr>
+        <p:spPr>
+          <a:xfrm>
+            <a:off x="7546680" y="3837901"/>
+            <a:ext cx="3269410" cy="2813919"/>
+          </a:xfrm>
+          <a:prstGeom prst="rect">
+            <a:avLst/>
+          </a:prstGeom>
+          <a:solidFill>
+            <a:schemeClr val="bg1"/>
+          </a:solidFill>
+          <a:ln w="57150">
+            <a:solidFill>
+              <a:srgbClr val="FF0000"/>
+            </a:solidFill>
+          </a:ln>
+        </p:spPr>
+        <p:style>
+          <a:lnRef idx="2">
+            <a:schemeClr val="accent1">
+              <a:shade val="50000"/>
+            </a:schemeClr>
+          </a:lnRef>
+          <a:fillRef idx="1">
+            <a:schemeClr val="accent1"/>
+          </a:fillRef>
+          <a:effectRef idx="0">
+            <a:schemeClr val="accent1"/>
+          </a:effectRef>
+          <a:fontRef idx="minor">
+            <a:schemeClr val="lt1"/>
+          </a:fontRef>
+        </p:style>
+        <p:txBody>
+          <a:bodyPr rtlCol="0" anchor="ctr"/>
+          <a:lstStyle/>
+          <a:p>
+            <a:pPr algn="ctr"/>
+            <a:endParaRPr lang="LID4096"/>
+          </a:p>
+        </p:txBody>
+      </p:sp>
+      <p:sp>
+        <p:nvSpPr>
           <p:cNvPr id="6" name="Rectangle 5">
             <a:extLst>
               <a:ext uri="{FF2B5EF4-FFF2-40B4-BE49-F238E27FC236}">
@@ -4449,60 +4503,6 @@
           <a:ln>
             <a:solidFill>
               <a:schemeClr val="accent2"/>
-            </a:solidFill>
-          </a:ln>
-        </p:spPr>
-        <p:style>
-          <a:lnRef idx="2">
-            <a:schemeClr val="accent1">
-              <a:shade val="50000"/>
-            </a:schemeClr>
-          </a:lnRef>
-          <a:fillRef idx="1">
-            <a:schemeClr val="accent1"/>
-          </a:fillRef>
-          <a:effectRef idx="0">
-            <a:schemeClr val="accent1"/>
-          </a:effectRef>
-          <a:fontRef idx="minor">
-            <a:schemeClr val="lt1"/>
-          </a:fontRef>
-        </p:style>
-        <p:txBody>
-          <a:bodyPr rtlCol="0" anchor="ctr"/>
-          <a:lstStyle/>
-          <a:p>
-            <a:pPr algn="ctr"/>
-            <a:endParaRPr lang="LID4096"/>
-          </a:p>
-        </p:txBody>
-      </p:sp>
-      <p:sp>
-        <p:nvSpPr>
-          <p:cNvPr id="11" name="Rectangle 10">
-            <a:extLst>
-              <a:ext uri="{FF2B5EF4-FFF2-40B4-BE49-F238E27FC236}">
-                <a16:creationId xmlns:a16="http://schemas.microsoft.com/office/drawing/2014/main" id="{ACEAE501-D912-47F3-864C-9D0DC7B33F00}"/>
-              </a:ext>
-            </a:extLst>
-          </p:cNvPr>
-          <p:cNvSpPr/>
-          <p:nvPr/>
-        </p:nvSpPr>
-        <p:spPr>
-          <a:xfrm>
-            <a:off x="7546680" y="3872405"/>
-            <a:ext cx="3269410" cy="2813919"/>
-          </a:xfrm>
-          <a:prstGeom prst="rect">
-            <a:avLst/>
-          </a:prstGeom>
-          <a:solidFill>
-            <a:schemeClr val="bg1"/>
-          </a:solidFill>
-          <a:ln w="57150">
-            <a:solidFill>
-              <a:srgbClr val="FF0000"/>
             </a:solidFill>
           </a:ln>
         </p:spPr>
@@ -4574,10 +4574,10 @@
       </p:grpSpPr>
       <p:sp>
         <p:nvSpPr>
-          <p:cNvPr id="4" name="Isosceles Triangle 3">
-            <a:extLst>
-              <a:ext uri="{FF2B5EF4-FFF2-40B4-BE49-F238E27FC236}">
-                <a16:creationId xmlns:a16="http://schemas.microsoft.com/office/drawing/2014/main" id="{1E092BBE-7E09-4F3D-BC2D-905C49F1A534}"/>
+          <p:cNvPr id="8" name="Rectangle 7">
+            <a:extLst>
+              <a:ext uri="{FF2B5EF4-FFF2-40B4-BE49-F238E27FC236}">
+                <a16:creationId xmlns:a16="http://schemas.microsoft.com/office/drawing/2014/main" id="{BB7BD4DF-BA1C-4036-A20E-3F021F5C47F8}"/>
               </a:ext>
             </a:extLst>
           </p:cNvPr>
@@ -4586,16 +4586,16 @@
         </p:nvSpPr>
         <p:spPr>
           <a:xfrm>
-            <a:off x="1213447" y="621102"/>
-            <a:ext cx="1958196" cy="1915063"/>
-          </a:xfrm>
-          <a:prstGeom prst="triangle">
+            <a:off x="640759" y="286253"/>
+            <a:ext cx="3269410" cy="2813919"/>
+          </a:xfrm>
+          <a:prstGeom prst="rect">
             <a:avLst/>
           </a:prstGeom>
           <a:solidFill>
-            <a:srgbClr val="FF0000"/>
+            <a:schemeClr val="bg1"/>
           </a:solidFill>
-          <a:ln>
+          <a:ln w="57150">
             <a:solidFill>
               <a:srgbClr val="FF0000"/>
             </a:solidFill>
@@ -4786,10 +4786,10 @@
       </p:sp>
       <p:sp>
         <p:nvSpPr>
-          <p:cNvPr id="8" name="Rectangle 7">
-            <a:extLst>
-              <a:ext uri="{FF2B5EF4-FFF2-40B4-BE49-F238E27FC236}">
-                <a16:creationId xmlns:a16="http://schemas.microsoft.com/office/drawing/2014/main" id="{BB7BD4DF-BA1C-4036-A20E-3F021F5C47F8}"/>
+          <p:cNvPr id="9" name="Isosceles Triangle 8">
+            <a:extLst>
+              <a:ext uri="{FF2B5EF4-FFF2-40B4-BE49-F238E27FC236}">
+                <a16:creationId xmlns:a16="http://schemas.microsoft.com/office/drawing/2014/main" id="{B9993535-7788-4F86-9AA3-FC76E25982BC}"/>
               </a:ext>
             </a:extLst>
           </p:cNvPr>
@@ -4798,18 +4798,18 @@
         </p:nvSpPr>
         <p:spPr>
           <a:xfrm>
-            <a:off x="640759" y="286253"/>
-            <a:ext cx="3269410" cy="2813919"/>
-          </a:xfrm>
-          <a:prstGeom prst="rect">
+            <a:off x="1213447" y="621102"/>
+            <a:ext cx="1958196" cy="1915063"/>
+          </a:xfrm>
+          <a:prstGeom prst="triangle">
             <a:avLst/>
           </a:prstGeom>
           <a:solidFill>
-            <a:schemeClr val="bg1"/>
+            <a:schemeClr val="accent2"/>
           </a:solidFill>
-          <a:ln w="57150">
+          <a:ln>
             <a:solidFill>
-              <a:srgbClr val="FF0000"/>
+              <a:schemeClr val="accent2"/>
             </a:solidFill>
           </a:ln>
         </p:spPr>
@@ -4881,6 +4881,60 @@
       </p:grpSpPr>
       <p:sp>
         <p:nvSpPr>
+          <p:cNvPr id="12" name="Rectangle 11">
+            <a:extLst>
+              <a:ext uri="{FF2B5EF4-FFF2-40B4-BE49-F238E27FC236}">
+                <a16:creationId xmlns:a16="http://schemas.microsoft.com/office/drawing/2014/main" id="{8F2F2424-D5BD-4B96-B5C7-E59A05791FBE}"/>
+              </a:ext>
+            </a:extLst>
+          </p:cNvPr>
+          <p:cNvSpPr/>
+          <p:nvPr/>
+        </p:nvSpPr>
+        <p:spPr>
+          <a:xfrm>
+            <a:off x="7546680" y="171671"/>
+            <a:ext cx="3269410" cy="2813919"/>
+          </a:xfrm>
+          <a:prstGeom prst="rect">
+            <a:avLst/>
+          </a:prstGeom>
+          <a:solidFill>
+            <a:schemeClr val="bg1"/>
+          </a:solidFill>
+          <a:ln w="57150">
+            <a:solidFill>
+              <a:srgbClr val="FF0000"/>
+            </a:solidFill>
+          </a:ln>
+        </p:spPr>
+        <p:style>
+          <a:lnRef idx="2">
+            <a:schemeClr val="accent1">
+              <a:shade val="50000"/>
+            </a:schemeClr>
+          </a:lnRef>
+          <a:fillRef idx="1">
+            <a:schemeClr val="accent1"/>
+          </a:fillRef>
+          <a:effectRef idx="0">
+            <a:schemeClr val="accent1"/>
+          </a:effectRef>
+          <a:fontRef idx="minor">
+            <a:schemeClr val="lt1"/>
+          </a:fontRef>
+        </p:style>
+        <p:txBody>
+          <a:bodyPr rtlCol="0" anchor="ctr"/>
+          <a:lstStyle/>
+          <a:p>
+            <a:pPr algn="ctr"/>
+            <a:endParaRPr lang="LID4096"/>
+          </a:p>
+        </p:txBody>
+      </p:sp>
+      <p:sp>
+        <p:nvSpPr>
           <p:cNvPr id="6" name="Rectangle 5">
             <a:extLst>
               <a:ext uri="{FF2B5EF4-FFF2-40B4-BE49-F238E27FC236}">
@@ -5063,60 +5117,6 @@
           <a:ln>
             <a:solidFill>
               <a:schemeClr val="accent2"/>
-            </a:solidFill>
-          </a:ln>
-        </p:spPr>
-        <p:style>
-          <a:lnRef idx="2">
-            <a:schemeClr val="accent1">
-              <a:shade val="50000"/>
-            </a:schemeClr>
-          </a:lnRef>
-          <a:fillRef idx="1">
-            <a:schemeClr val="accent1"/>
-          </a:fillRef>
-          <a:effectRef idx="0">
-            <a:schemeClr val="accent1"/>
-          </a:effectRef>
-          <a:fontRef idx="minor">
-            <a:schemeClr val="lt1"/>
-          </a:fontRef>
-        </p:style>
-        <p:txBody>
-          <a:bodyPr rtlCol="0" anchor="ctr"/>
-          <a:lstStyle/>
-          <a:p>
-            <a:pPr algn="ctr"/>
-            <a:endParaRPr lang="LID4096"/>
-          </a:p>
-        </p:txBody>
-      </p:sp>
-      <p:sp>
-        <p:nvSpPr>
-          <p:cNvPr id="12" name="Rectangle 11">
-            <a:extLst>
-              <a:ext uri="{FF2B5EF4-FFF2-40B4-BE49-F238E27FC236}">
-                <a16:creationId xmlns:a16="http://schemas.microsoft.com/office/drawing/2014/main" id="{8F2F2424-D5BD-4B96-B5C7-E59A05791FBE}"/>
-              </a:ext>
-            </a:extLst>
-          </p:cNvPr>
-          <p:cNvSpPr/>
-          <p:nvPr/>
-        </p:nvSpPr>
-        <p:spPr>
-          <a:xfrm>
-            <a:off x="7546680" y="171671"/>
-            <a:ext cx="3269410" cy="2813919"/>
-          </a:xfrm>
-          <a:prstGeom prst="rect">
-            <a:avLst/>
-          </a:prstGeom>
-          <a:solidFill>
-            <a:schemeClr val="bg1"/>
-          </a:solidFill>
-          <a:ln w="57150">
-            <a:solidFill>
-              <a:srgbClr val="FF0000"/>
             </a:solidFill>
           </a:ln>
         </p:spPr>
@@ -5188,6 +5188,60 @@
       </p:grpSpPr>
       <p:sp>
         <p:nvSpPr>
+          <p:cNvPr id="11" name="Rectangle 10">
+            <a:extLst>
+              <a:ext uri="{FF2B5EF4-FFF2-40B4-BE49-F238E27FC236}">
+                <a16:creationId xmlns:a16="http://schemas.microsoft.com/office/drawing/2014/main" id="{0F285830-D8A9-474D-A07E-0045D2E0D791}"/>
+              </a:ext>
+            </a:extLst>
+          </p:cNvPr>
+          <p:cNvSpPr/>
+          <p:nvPr/>
+        </p:nvSpPr>
+        <p:spPr>
+          <a:xfrm>
+            <a:off x="557840" y="3726634"/>
+            <a:ext cx="3269410" cy="2813919"/>
+          </a:xfrm>
+          <a:prstGeom prst="rect">
+            <a:avLst/>
+          </a:prstGeom>
+          <a:solidFill>
+            <a:schemeClr val="bg1"/>
+          </a:solidFill>
+          <a:ln w="57150">
+            <a:solidFill>
+              <a:srgbClr val="FF0000"/>
+            </a:solidFill>
+          </a:ln>
+        </p:spPr>
+        <p:style>
+          <a:lnRef idx="2">
+            <a:schemeClr val="accent1">
+              <a:shade val="50000"/>
+            </a:schemeClr>
+          </a:lnRef>
+          <a:fillRef idx="1">
+            <a:schemeClr val="accent1"/>
+          </a:fillRef>
+          <a:effectRef idx="0">
+            <a:schemeClr val="accent1"/>
+          </a:effectRef>
+          <a:fontRef idx="minor">
+            <a:schemeClr val="lt1"/>
+          </a:fontRef>
+        </p:style>
+        <p:txBody>
+          <a:bodyPr rtlCol="0" anchor="ctr"/>
+          <a:lstStyle/>
+          <a:p>
+            <a:pPr algn="ctr"/>
+            <a:endParaRPr lang="LID4096"/>
+          </a:p>
+        </p:txBody>
+      </p:sp>
+      <p:sp>
+        <p:nvSpPr>
           <p:cNvPr id="6" name="Rectangle 5">
             <a:extLst>
               <a:ext uri="{FF2B5EF4-FFF2-40B4-BE49-F238E27FC236}">
@@ -5370,60 +5424,6 @@
           <a:ln>
             <a:solidFill>
               <a:schemeClr val="accent2"/>
-            </a:solidFill>
-          </a:ln>
-        </p:spPr>
-        <p:style>
-          <a:lnRef idx="2">
-            <a:schemeClr val="accent1">
-              <a:shade val="50000"/>
-            </a:schemeClr>
-          </a:lnRef>
-          <a:fillRef idx="1">
-            <a:schemeClr val="accent1"/>
-          </a:fillRef>
-          <a:effectRef idx="0">
-            <a:schemeClr val="accent1"/>
-          </a:effectRef>
-          <a:fontRef idx="minor">
-            <a:schemeClr val="lt1"/>
-          </a:fontRef>
-        </p:style>
-        <p:txBody>
-          <a:bodyPr rtlCol="0" anchor="ctr"/>
-          <a:lstStyle/>
-          <a:p>
-            <a:pPr algn="ctr"/>
-            <a:endParaRPr lang="LID4096"/>
-          </a:p>
-        </p:txBody>
-      </p:sp>
-      <p:sp>
-        <p:nvSpPr>
-          <p:cNvPr id="11" name="Rectangle 10">
-            <a:extLst>
-              <a:ext uri="{FF2B5EF4-FFF2-40B4-BE49-F238E27FC236}">
-                <a16:creationId xmlns:a16="http://schemas.microsoft.com/office/drawing/2014/main" id="{0F285830-D8A9-474D-A07E-0045D2E0D791}"/>
-              </a:ext>
-            </a:extLst>
-          </p:cNvPr>
-          <p:cNvSpPr/>
-          <p:nvPr/>
-        </p:nvSpPr>
-        <p:spPr>
-          <a:xfrm>
-            <a:off x="557840" y="3726634"/>
-            <a:ext cx="3269410" cy="2813919"/>
-          </a:xfrm>
-          <a:prstGeom prst="rect">
-            <a:avLst/>
-          </a:prstGeom>
-          <a:solidFill>
-            <a:schemeClr val="bg1"/>
-          </a:solidFill>
-          <a:ln w="57150">
-            <a:solidFill>
-              <a:srgbClr val="FF0000"/>
             </a:solidFill>
           </a:ln>
         </p:spPr>

</xml_diff>

<commit_message>
add 2 class triggers
</commit_message>
<xml_diff>
--- a/P300/TriggersBank/visual tirggers.pptx
+++ b/P300/TriggersBank/visual tirggers.pptx
@@ -6,9 +6,9 @@
   </p:sldMasterIdLst>
   <p:sldIdLst>
     <p:sldId id="256" r:id="rId2"/>
-    <p:sldId id="257" r:id="rId3"/>
-    <p:sldId id="258" r:id="rId4"/>
-    <p:sldId id="259" r:id="rId5"/>
+    <p:sldId id="276" r:id="rId3"/>
+    <p:sldId id="279" r:id="rId4"/>
+    <p:sldId id="280" r:id="rId5"/>
     <p:sldId id="260" r:id="rId6"/>
     <p:sldId id="261" r:id="rId7"/>
     <p:sldId id="263" r:id="rId8"/>
@@ -128,9 +128,9 @@
         <p14:section name="2 classes" id="{B1D218AE-EE56-4BFC-A219-E9D5E7712C38}">
           <p14:sldIdLst>
             <p14:sldId id="256"/>
-            <p14:sldId id="257"/>
-            <p14:sldId id="258"/>
-            <p14:sldId id="259"/>
+            <p14:sldId id="276"/>
+            <p14:sldId id="279"/>
+            <p14:sldId id="280"/>
           </p14:sldIdLst>
         </p14:section>
         <p14:section name="3 classes" id="{520DAD1B-CF64-4C86-B38A-1D948092B84C}">
@@ -318,7 +318,7 @@
           <a:p>
             <a:fld id="{7755E296-41C4-4F6E-A85E-738092B59B31}" type="datetimeFigureOut">
               <a:rPr lang="LID4096" smtClean="0"/>
-              <a:t>05/04/2022</a:t>
+              <a:t>06/14/2022</a:t>
             </a:fld>
             <a:endParaRPr lang="LID4096"/>
           </a:p>
@@ -518,7 +518,7 @@
           <a:p>
             <a:fld id="{7755E296-41C4-4F6E-A85E-738092B59B31}" type="datetimeFigureOut">
               <a:rPr lang="LID4096" smtClean="0"/>
-              <a:t>05/04/2022</a:t>
+              <a:t>06/14/2022</a:t>
             </a:fld>
             <a:endParaRPr lang="LID4096"/>
           </a:p>
@@ -728,7 +728,7 @@
           <a:p>
             <a:fld id="{7755E296-41C4-4F6E-A85E-738092B59B31}" type="datetimeFigureOut">
               <a:rPr lang="LID4096" smtClean="0"/>
-              <a:t>05/04/2022</a:t>
+              <a:t>06/14/2022</a:t>
             </a:fld>
             <a:endParaRPr lang="LID4096"/>
           </a:p>
@@ -928,7 +928,7 @@
           <a:p>
             <a:fld id="{7755E296-41C4-4F6E-A85E-738092B59B31}" type="datetimeFigureOut">
               <a:rPr lang="LID4096" smtClean="0"/>
-              <a:t>05/04/2022</a:t>
+              <a:t>06/14/2022</a:t>
             </a:fld>
             <a:endParaRPr lang="LID4096"/>
           </a:p>
@@ -1204,7 +1204,7 @@
           <a:p>
             <a:fld id="{7755E296-41C4-4F6E-A85E-738092B59B31}" type="datetimeFigureOut">
               <a:rPr lang="LID4096" smtClean="0"/>
-              <a:t>05/04/2022</a:t>
+              <a:t>06/14/2022</a:t>
             </a:fld>
             <a:endParaRPr lang="LID4096"/>
           </a:p>
@@ -1472,7 +1472,7 @@
           <a:p>
             <a:fld id="{7755E296-41C4-4F6E-A85E-738092B59B31}" type="datetimeFigureOut">
               <a:rPr lang="LID4096" smtClean="0"/>
-              <a:t>05/04/2022</a:t>
+              <a:t>06/14/2022</a:t>
             </a:fld>
             <a:endParaRPr lang="LID4096"/>
           </a:p>
@@ -1887,7 +1887,7 @@
           <a:p>
             <a:fld id="{7755E296-41C4-4F6E-A85E-738092B59B31}" type="datetimeFigureOut">
               <a:rPr lang="LID4096" smtClean="0"/>
-              <a:t>05/04/2022</a:t>
+              <a:t>06/14/2022</a:t>
             </a:fld>
             <a:endParaRPr lang="LID4096"/>
           </a:p>
@@ -2029,7 +2029,7 @@
           <a:p>
             <a:fld id="{7755E296-41C4-4F6E-A85E-738092B59B31}" type="datetimeFigureOut">
               <a:rPr lang="LID4096" smtClean="0"/>
-              <a:t>05/04/2022</a:t>
+              <a:t>06/14/2022</a:t>
             </a:fld>
             <a:endParaRPr lang="LID4096"/>
           </a:p>
@@ -2142,7 +2142,7 @@
           <a:p>
             <a:fld id="{7755E296-41C4-4F6E-A85E-738092B59B31}" type="datetimeFigureOut">
               <a:rPr lang="LID4096" smtClean="0"/>
-              <a:t>05/04/2022</a:t>
+              <a:t>06/14/2022</a:t>
             </a:fld>
             <a:endParaRPr lang="LID4096"/>
           </a:p>
@@ -2455,7 +2455,7 @@
           <a:p>
             <a:fld id="{7755E296-41C4-4F6E-A85E-738092B59B31}" type="datetimeFigureOut">
               <a:rPr lang="LID4096" smtClean="0"/>
-              <a:t>05/04/2022</a:t>
+              <a:t>06/14/2022</a:t>
             </a:fld>
             <a:endParaRPr lang="LID4096"/>
           </a:p>
@@ -2744,7 +2744,7 @@
           <a:p>
             <a:fld id="{7755E296-41C4-4F6E-A85E-738092B59B31}" type="datetimeFigureOut">
               <a:rPr lang="LID4096" smtClean="0"/>
-              <a:t>05/04/2022</a:t>
+              <a:t>06/14/2022</a:t>
             </a:fld>
             <a:endParaRPr lang="LID4096"/>
           </a:p>
@@ -2987,7 +2987,7 @@
           <a:p>
             <a:fld id="{7755E296-41C4-4F6E-A85E-738092B59B31}" type="datetimeFigureOut">
               <a:rPr lang="LID4096" smtClean="0"/>
-              <a:t>05/04/2022</a:t>
+              <a:t>06/14/2022</a:t>
             </a:fld>
             <a:endParaRPr lang="LID4096"/>
           </a:p>
@@ -3429,7 +3429,7 @@
         </p:nvSpPr>
         <p:spPr>
           <a:xfrm>
-            <a:off x="1371600" y="1069676"/>
+            <a:off x="1371599" y="1069676"/>
             <a:ext cx="1958196" cy="1915063"/>
           </a:xfrm>
           <a:prstGeom prst="triangle">
@@ -3517,10 +3517,10 @@
       </p:sp>
       <p:sp>
         <p:nvSpPr>
-          <p:cNvPr id="7" name="Oval 6">
-            <a:extLst>
-              <a:ext uri="{FF2B5EF4-FFF2-40B4-BE49-F238E27FC236}">
-                <a16:creationId xmlns:a16="http://schemas.microsoft.com/office/drawing/2014/main" id="{7F8D11B8-FA0D-471C-9F07-CF11310F081C}"/>
+          <p:cNvPr id="10" name="Multiplication Sign 9">
+            <a:extLst>
+              <a:ext uri="{FF2B5EF4-FFF2-40B4-BE49-F238E27FC236}">
+                <a16:creationId xmlns:a16="http://schemas.microsoft.com/office/drawing/2014/main" id="{C8C22A79-15BB-EB26-A597-FB4A196D1427}"/>
               </a:ext>
             </a:extLst>
           </p:cNvPr>
@@ -3529,18 +3529,22 @@
         </p:nvSpPr>
         <p:spPr>
           <a:xfrm>
-            <a:off x="5138468" y="4157933"/>
-            <a:ext cx="1915063" cy="1915063"/>
-          </a:xfrm>
-          <a:prstGeom prst="ellipse">
+            <a:off x="4607415" y="3275000"/>
+            <a:ext cx="2977169" cy="2694013"/>
+          </a:xfrm>
+          <a:prstGeom prst="mathMultiply">
             <a:avLst/>
           </a:prstGeom>
           <a:solidFill>
-            <a:srgbClr val="00B050"/>
+            <a:schemeClr val="accent4">
+              <a:lumMod val="75000"/>
+            </a:schemeClr>
           </a:solidFill>
           <a:ln>
             <a:solidFill>
-              <a:srgbClr val="00B050"/>
+              <a:schemeClr val="accent4">
+                <a:lumMod val="75000"/>
+              </a:schemeClr>
             </a:solidFill>
           </a:ln>
         </p:spPr>
@@ -5471,10 +5475,7 @@
     <p:bg>
       <p:bgPr>
         <a:solidFill>
-          <a:schemeClr val="tx1">
-            <a:lumMod val="85000"/>
-            <a:lumOff val="15000"/>
-          </a:schemeClr>
+          <a:schemeClr val="tx1"/>
         </a:solidFill>
         <a:effectLst/>
       </p:bgPr>
@@ -5495,10 +5496,10 @@
       </p:grpSpPr>
       <p:sp>
         <p:nvSpPr>
-          <p:cNvPr id="4" name="Isosceles Triangle 3">
-            <a:extLst>
-              <a:ext uri="{FF2B5EF4-FFF2-40B4-BE49-F238E27FC236}">
-                <a16:creationId xmlns:a16="http://schemas.microsoft.com/office/drawing/2014/main" id="{1E092BBE-7E09-4F3D-BC2D-905C49F1A534}"/>
+          <p:cNvPr id="5" name="Rectangle 4">
+            <a:extLst>
+              <a:ext uri="{FF2B5EF4-FFF2-40B4-BE49-F238E27FC236}">
+                <a16:creationId xmlns:a16="http://schemas.microsoft.com/office/drawing/2014/main" id="{D07C9ECF-729C-D5FF-A15A-0A890B1B9335}"/>
               </a:ext>
             </a:extLst>
           </p:cNvPr>
@@ -5507,7 +5508,61 @@
         </p:nvSpPr>
         <p:spPr>
           <a:xfrm>
-            <a:off x="1371600" y="1069676"/>
+            <a:off x="4461294" y="3215046"/>
+            <a:ext cx="3269410" cy="2813919"/>
+          </a:xfrm>
+          <a:prstGeom prst="rect">
+            <a:avLst/>
+          </a:prstGeom>
+          <a:solidFill>
+            <a:schemeClr val="bg1"/>
+          </a:solidFill>
+          <a:ln w="57150">
+            <a:solidFill>
+              <a:srgbClr val="FF0000"/>
+            </a:solidFill>
+          </a:ln>
+        </p:spPr>
+        <p:style>
+          <a:lnRef idx="2">
+            <a:schemeClr val="accent1">
+              <a:shade val="50000"/>
+            </a:schemeClr>
+          </a:lnRef>
+          <a:fillRef idx="1">
+            <a:schemeClr val="accent1"/>
+          </a:fillRef>
+          <a:effectRef idx="0">
+            <a:schemeClr val="accent1"/>
+          </a:effectRef>
+          <a:fontRef idx="minor">
+            <a:schemeClr val="lt1"/>
+          </a:fontRef>
+        </p:style>
+        <p:txBody>
+          <a:bodyPr rtlCol="0" anchor="ctr"/>
+          <a:lstStyle/>
+          <a:p>
+            <a:pPr algn="ctr"/>
+            <a:endParaRPr lang="LID4096"/>
+          </a:p>
+        </p:txBody>
+      </p:sp>
+      <p:sp>
+        <p:nvSpPr>
+          <p:cNvPr id="4" name="Isosceles Triangle 3">
+            <a:extLst>
+              <a:ext uri="{FF2B5EF4-FFF2-40B4-BE49-F238E27FC236}">
+                <a16:creationId xmlns:a16="http://schemas.microsoft.com/office/drawing/2014/main" id="{1E092BBE-7E09-4F3D-BC2D-905C49F1A534}"/>
+              </a:ext>
+            </a:extLst>
+          </p:cNvPr>
+          <p:cNvSpPr/>
+          <p:nvPr/>
+        </p:nvSpPr>
+        <p:spPr>
+          <a:xfrm>
+            <a:off x="1371599" y="1069676"/>
             <a:ext cx="1958196" cy="1915063"/>
           </a:xfrm>
           <a:prstGeom prst="triangle">
@@ -5595,10 +5650,10 @@
       </p:sp>
       <p:sp>
         <p:nvSpPr>
-          <p:cNvPr id="7" name="Oval 6">
-            <a:extLst>
-              <a:ext uri="{FF2B5EF4-FFF2-40B4-BE49-F238E27FC236}">
-                <a16:creationId xmlns:a16="http://schemas.microsoft.com/office/drawing/2014/main" id="{7F8D11B8-FA0D-471C-9F07-CF11310F081C}"/>
+          <p:cNvPr id="10" name="Multiplication Sign 9">
+            <a:extLst>
+              <a:ext uri="{FF2B5EF4-FFF2-40B4-BE49-F238E27FC236}">
+                <a16:creationId xmlns:a16="http://schemas.microsoft.com/office/drawing/2014/main" id="{C8C22A79-15BB-EB26-A597-FB4A196D1427}"/>
               </a:ext>
             </a:extLst>
           </p:cNvPr>
@@ -5607,18 +5662,22 @@
         </p:nvSpPr>
         <p:spPr>
           <a:xfrm>
-            <a:off x="5138468" y="4157933"/>
-            <a:ext cx="1915063" cy="1915063"/>
-          </a:xfrm>
-          <a:prstGeom prst="ellipse">
+            <a:off x="4607415" y="3275000"/>
+            <a:ext cx="2977169" cy="2694013"/>
+          </a:xfrm>
+          <a:prstGeom prst="mathMultiply">
             <a:avLst/>
           </a:prstGeom>
           <a:solidFill>
-            <a:srgbClr val="00B050"/>
+            <a:schemeClr val="accent4">
+              <a:lumMod val="75000"/>
+            </a:schemeClr>
           </a:solidFill>
           <a:ln>
             <a:solidFill>
-              <a:srgbClr val="00B050"/>
+              <a:schemeClr val="accent4">
+                <a:lumMod val="75000"/>
+              </a:schemeClr>
             </a:solidFill>
           </a:ln>
         </p:spPr>
@@ -5647,62 +5706,10 @@
           </a:p>
         </p:txBody>
       </p:sp>
-      <p:sp>
-        <p:nvSpPr>
-          <p:cNvPr id="2" name="Rectangle 1">
-            <a:extLst>
-              <a:ext uri="{FF2B5EF4-FFF2-40B4-BE49-F238E27FC236}">
-                <a16:creationId xmlns:a16="http://schemas.microsoft.com/office/drawing/2014/main" id="{FE756012-084D-440E-ACB3-BED6D1348117}"/>
-              </a:ext>
-            </a:extLst>
-          </p:cNvPr>
-          <p:cNvSpPr/>
-          <p:nvPr/>
-        </p:nvSpPr>
-        <p:spPr>
-          <a:xfrm>
-            <a:off x="957532" y="905775"/>
-            <a:ext cx="2786332" cy="2398143"/>
-          </a:xfrm>
-          <a:prstGeom prst="rect">
-            <a:avLst/>
-          </a:prstGeom>
-          <a:noFill/>
-          <a:ln w="57150">
-            <a:solidFill>
-              <a:srgbClr val="FFFF00"/>
-            </a:solidFill>
-          </a:ln>
-        </p:spPr>
-        <p:style>
-          <a:lnRef idx="2">
-            <a:schemeClr val="accent1">
-              <a:shade val="50000"/>
-            </a:schemeClr>
-          </a:lnRef>
-          <a:fillRef idx="1">
-            <a:schemeClr val="accent1"/>
-          </a:fillRef>
-          <a:effectRef idx="0">
-            <a:schemeClr val="accent1"/>
-          </a:effectRef>
-          <a:fontRef idx="minor">
-            <a:schemeClr val="lt1"/>
-          </a:fontRef>
-        </p:style>
-        <p:txBody>
-          <a:bodyPr rtlCol="0" anchor="ctr"/>
-          <a:lstStyle/>
-          <a:p>
-            <a:pPr algn="ctr"/>
-            <a:endParaRPr lang="LID4096"/>
-          </a:p>
-        </p:txBody>
-      </p:sp>
     </p:spTree>
     <p:extLst>
       <p:ext uri="{BB962C8B-B14F-4D97-AF65-F5344CB8AC3E}">
-        <p14:creationId xmlns:p14="http://schemas.microsoft.com/office/powerpoint/2010/main" val="351865871"/>
+        <p14:creationId xmlns:p14="http://schemas.microsoft.com/office/powerpoint/2010/main" val="2166946610"/>
       </p:ext>
     </p:extLst>
   </p:cSld>
@@ -5718,10 +5725,7 @@
     <p:bg>
       <p:bgPr>
         <a:solidFill>
-          <a:schemeClr val="tx1">
-            <a:lumMod val="85000"/>
-            <a:lumOff val="15000"/>
-          </a:schemeClr>
+          <a:schemeClr val="tx1"/>
         </a:solidFill>
         <a:effectLst/>
       </p:bgPr>
@@ -5742,10 +5746,10 @@
       </p:grpSpPr>
       <p:sp>
         <p:nvSpPr>
-          <p:cNvPr id="4" name="Isosceles Triangle 3">
-            <a:extLst>
-              <a:ext uri="{FF2B5EF4-FFF2-40B4-BE49-F238E27FC236}">
-                <a16:creationId xmlns:a16="http://schemas.microsoft.com/office/drawing/2014/main" id="{1E092BBE-7E09-4F3D-BC2D-905C49F1A534}"/>
+          <p:cNvPr id="5" name="Rectangle 4">
+            <a:extLst>
+              <a:ext uri="{FF2B5EF4-FFF2-40B4-BE49-F238E27FC236}">
+                <a16:creationId xmlns:a16="http://schemas.microsoft.com/office/drawing/2014/main" id="{1691581E-A07D-6023-9B22-B3CB70B946BD}"/>
               </a:ext>
             </a:extLst>
           </p:cNvPr>
@@ -5754,7 +5758,61 @@
         </p:nvSpPr>
         <p:spPr>
           <a:xfrm>
-            <a:off x="1371600" y="1069676"/>
+            <a:off x="8285674" y="620247"/>
+            <a:ext cx="3269410" cy="2813919"/>
+          </a:xfrm>
+          <a:prstGeom prst="rect">
+            <a:avLst/>
+          </a:prstGeom>
+          <a:solidFill>
+            <a:schemeClr val="bg1"/>
+          </a:solidFill>
+          <a:ln w="57150">
+            <a:solidFill>
+              <a:srgbClr val="FF0000"/>
+            </a:solidFill>
+          </a:ln>
+        </p:spPr>
+        <p:style>
+          <a:lnRef idx="2">
+            <a:schemeClr val="accent1">
+              <a:shade val="50000"/>
+            </a:schemeClr>
+          </a:lnRef>
+          <a:fillRef idx="1">
+            <a:schemeClr val="accent1"/>
+          </a:fillRef>
+          <a:effectRef idx="0">
+            <a:schemeClr val="accent1"/>
+          </a:effectRef>
+          <a:fontRef idx="minor">
+            <a:schemeClr val="lt1"/>
+          </a:fontRef>
+        </p:style>
+        <p:txBody>
+          <a:bodyPr rtlCol="0" anchor="ctr"/>
+          <a:lstStyle/>
+          <a:p>
+            <a:pPr algn="ctr"/>
+            <a:endParaRPr lang="LID4096"/>
+          </a:p>
+        </p:txBody>
+      </p:sp>
+      <p:sp>
+        <p:nvSpPr>
+          <p:cNvPr id="4" name="Isosceles Triangle 3">
+            <a:extLst>
+              <a:ext uri="{FF2B5EF4-FFF2-40B4-BE49-F238E27FC236}">
+                <a16:creationId xmlns:a16="http://schemas.microsoft.com/office/drawing/2014/main" id="{1E092BBE-7E09-4F3D-BC2D-905C49F1A534}"/>
+              </a:ext>
+            </a:extLst>
+          </p:cNvPr>
+          <p:cNvSpPr/>
+          <p:nvPr/>
+        </p:nvSpPr>
+        <p:spPr>
+          <a:xfrm>
+            <a:off x="1371599" y="1069676"/>
             <a:ext cx="1958196" cy="1915063"/>
           </a:xfrm>
           <a:prstGeom prst="triangle">
@@ -5842,10 +5900,10 @@
       </p:sp>
       <p:sp>
         <p:nvSpPr>
-          <p:cNvPr id="7" name="Oval 6">
-            <a:extLst>
-              <a:ext uri="{FF2B5EF4-FFF2-40B4-BE49-F238E27FC236}">
-                <a16:creationId xmlns:a16="http://schemas.microsoft.com/office/drawing/2014/main" id="{7F8D11B8-FA0D-471C-9F07-CF11310F081C}"/>
+          <p:cNvPr id="10" name="Multiplication Sign 9">
+            <a:extLst>
+              <a:ext uri="{FF2B5EF4-FFF2-40B4-BE49-F238E27FC236}">
+                <a16:creationId xmlns:a16="http://schemas.microsoft.com/office/drawing/2014/main" id="{C8C22A79-15BB-EB26-A597-FB4A196D1427}"/>
               </a:ext>
             </a:extLst>
           </p:cNvPr>
@@ -5854,18 +5912,22 @@
         </p:nvSpPr>
         <p:spPr>
           <a:xfrm>
-            <a:off x="5138468" y="4157933"/>
-            <a:ext cx="1915063" cy="1915063"/>
-          </a:xfrm>
-          <a:prstGeom prst="ellipse">
+            <a:off x="4607415" y="3275000"/>
+            <a:ext cx="2977169" cy="2694013"/>
+          </a:xfrm>
+          <a:prstGeom prst="mathMultiply">
             <a:avLst/>
           </a:prstGeom>
           <a:solidFill>
-            <a:srgbClr val="00B050"/>
+            <a:schemeClr val="accent4">
+              <a:lumMod val="75000"/>
+            </a:schemeClr>
           </a:solidFill>
           <a:ln>
             <a:solidFill>
-              <a:srgbClr val="00B050"/>
+              <a:schemeClr val="accent4">
+                <a:lumMod val="75000"/>
+              </a:schemeClr>
             </a:solidFill>
           </a:ln>
         </p:spPr>
@@ -5894,62 +5956,10 @@
           </a:p>
         </p:txBody>
       </p:sp>
-      <p:sp>
-        <p:nvSpPr>
-          <p:cNvPr id="2" name="Rectangle 1">
-            <a:extLst>
-              <a:ext uri="{FF2B5EF4-FFF2-40B4-BE49-F238E27FC236}">
-                <a16:creationId xmlns:a16="http://schemas.microsoft.com/office/drawing/2014/main" id="{FE756012-084D-440E-ACB3-BED6D1348117}"/>
-              </a:ext>
-            </a:extLst>
-          </p:cNvPr>
-          <p:cNvSpPr/>
-          <p:nvPr/>
-        </p:nvSpPr>
-        <p:spPr>
-          <a:xfrm>
-            <a:off x="8527213" y="828135"/>
-            <a:ext cx="2786332" cy="2398143"/>
-          </a:xfrm>
-          <a:prstGeom prst="rect">
-            <a:avLst/>
-          </a:prstGeom>
-          <a:noFill/>
-          <a:ln w="57150">
-            <a:solidFill>
-              <a:srgbClr val="FFFF00"/>
-            </a:solidFill>
-          </a:ln>
-        </p:spPr>
-        <p:style>
-          <a:lnRef idx="2">
-            <a:schemeClr val="accent1">
-              <a:shade val="50000"/>
-            </a:schemeClr>
-          </a:lnRef>
-          <a:fillRef idx="1">
-            <a:schemeClr val="accent1"/>
-          </a:fillRef>
-          <a:effectRef idx="0">
-            <a:schemeClr val="accent1"/>
-          </a:effectRef>
-          <a:fontRef idx="minor">
-            <a:schemeClr val="lt1"/>
-          </a:fontRef>
-        </p:style>
-        <p:txBody>
-          <a:bodyPr rtlCol="0" anchor="ctr"/>
-          <a:lstStyle/>
-          <a:p>
-            <a:pPr algn="ctr"/>
-            <a:endParaRPr lang="LID4096"/>
-          </a:p>
-        </p:txBody>
-      </p:sp>
     </p:spTree>
     <p:extLst>
       <p:ext uri="{BB962C8B-B14F-4D97-AF65-F5344CB8AC3E}">
-        <p14:creationId xmlns:p14="http://schemas.microsoft.com/office/powerpoint/2010/main" val="3241082789"/>
+        <p14:creationId xmlns:p14="http://schemas.microsoft.com/office/powerpoint/2010/main" val="3067732529"/>
       </p:ext>
     </p:extLst>
   </p:cSld>
@@ -5965,10 +5975,7 @@
     <p:bg>
       <p:bgPr>
         <a:solidFill>
-          <a:schemeClr val="tx1">
-            <a:lumMod val="85000"/>
-            <a:lumOff val="15000"/>
-          </a:schemeClr>
+          <a:schemeClr val="tx1"/>
         </a:solidFill>
         <a:effectLst/>
       </p:bgPr>
@@ -5989,10 +5996,10 @@
       </p:grpSpPr>
       <p:sp>
         <p:nvSpPr>
-          <p:cNvPr id="4" name="Isosceles Triangle 3">
-            <a:extLst>
-              <a:ext uri="{FF2B5EF4-FFF2-40B4-BE49-F238E27FC236}">
-                <a16:creationId xmlns:a16="http://schemas.microsoft.com/office/drawing/2014/main" id="{1E092BBE-7E09-4F3D-BC2D-905C49F1A534}"/>
+          <p:cNvPr id="5" name="Rectangle 4">
+            <a:extLst>
+              <a:ext uri="{FF2B5EF4-FFF2-40B4-BE49-F238E27FC236}">
+                <a16:creationId xmlns:a16="http://schemas.microsoft.com/office/drawing/2014/main" id="{D07C9ECF-729C-D5FF-A15A-0A890B1B9335}"/>
               </a:ext>
             </a:extLst>
           </p:cNvPr>
@@ -6001,7 +6008,155 @@
         </p:nvSpPr>
         <p:spPr>
           <a:xfrm>
-            <a:off x="1371600" y="1069676"/>
+            <a:off x="715992" y="771739"/>
+            <a:ext cx="3269410" cy="2813919"/>
+          </a:xfrm>
+          <a:prstGeom prst="rect">
+            <a:avLst/>
+          </a:prstGeom>
+          <a:solidFill>
+            <a:schemeClr val="bg1"/>
+          </a:solidFill>
+          <a:ln w="57150">
+            <a:solidFill>
+              <a:srgbClr val="FF0000"/>
+            </a:solidFill>
+          </a:ln>
+        </p:spPr>
+        <p:style>
+          <a:lnRef idx="2">
+            <a:schemeClr val="accent1">
+              <a:shade val="50000"/>
+            </a:schemeClr>
+          </a:lnRef>
+          <a:fillRef idx="1">
+            <a:schemeClr val="accent1"/>
+          </a:fillRef>
+          <a:effectRef idx="0">
+            <a:schemeClr val="accent1"/>
+          </a:effectRef>
+          <a:fontRef idx="minor">
+            <a:schemeClr val="lt1"/>
+          </a:fontRef>
+        </p:style>
+        <p:txBody>
+          <a:bodyPr rtlCol="0" anchor="ctr"/>
+          <a:lstStyle>
+            <a:defPPr>
+              <a:defRPr lang="LID4096"/>
+            </a:defPPr>
+            <a:lvl1pPr marL="0" algn="l" defTabSz="914400" rtl="0" eaLnBrk="1" latinLnBrk="0" hangingPunct="1">
+              <a:defRPr sz="1800" kern="1200">
+                <a:solidFill>
+                  <a:schemeClr val="lt1"/>
+                </a:solidFill>
+                <a:latin typeface="+mn-lt"/>
+                <a:ea typeface="+mn-ea"/>
+                <a:cs typeface="+mn-cs"/>
+              </a:defRPr>
+            </a:lvl1pPr>
+            <a:lvl2pPr marL="457200" algn="l" defTabSz="914400" rtl="0" eaLnBrk="1" latinLnBrk="0" hangingPunct="1">
+              <a:defRPr sz="1800" kern="1200">
+                <a:solidFill>
+                  <a:schemeClr val="lt1"/>
+                </a:solidFill>
+                <a:latin typeface="+mn-lt"/>
+                <a:ea typeface="+mn-ea"/>
+                <a:cs typeface="+mn-cs"/>
+              </a:defRPr>
+            </a:lvl2pPr>
+            <a:lvl3pPr marL="914400" algn="l" defTabSz="914400" rtl="0" eaLnBrk="1" latinLnBrk="0" hangingPunct="1">
+              <a:defRPr sz="1800" kern="1200">
+                <a:solidFill>
+                  <a:schemeClr val="lt1"/>
+                </a:solidFill>
+                <a:latin typeface="+mn-lt"/>
+                <a:ea typeface="+mn-ea"/>
+                <a:cs typeface="+mn-cs"/>
+              </a:defRPr>
+            </a:lvl3pPr>
+            <a:lvl4pPr marL="1371600" algn="l" defTabSz="914400" rtl="0" eaLnBrk="1" latinLnBrk="0" hangingPunct="1">
+              <a:defRPr sz="1800" kern="1200">
+                <a:solidFill>
+                  <a:schemeClr val="lt1"/>
+                </a:solidFill>
+                <a:latin typeface="+mn-lt"/>
+                <a:ea typeface="+mn-ea"/>
+                <a:cs typeface="+mn-cs"/>
+              </a:defRPr>
+            </a:lvl4pPr>
+            <a:lvl5pPr marL="1828800" algn="l" defTabSz="914400" rtl="0" eaLnBrk="1" latinLnBrk="0" hangingPunct="1">
+              <a:defRPr sz="1800" kern="1200">
+                <a:solidFill>
+                  <a:schemeClr val="lt1"/>
+                </a:solidFill>
+                <a:latin typeface="+mn-lt"/>
+                <a:ea typeface="+mn-ea"/>
+                <a:cs typeface="+mn-cs"/>
+              </a:defRPr>
+            </a:lvl5pPr>
+            <a:lvl6pPr marL="2286000" algn="l" defTabSz="914400" rtl="0" eaLnBrk="1" latinLnBrk="0" hangingPunct="1">
+              <a:defRPr sz="1800" kern="1200">
+                <a:solidFill>
+                  <a:schemeClr val="lt1"/>
+                </a:solidFill>
+                <a:latin typeface="+mn-lt"/>
+                <a:ea typeface="+mn-ea"/>
+                <a:cs typeface="+mn-cs"/>
+              </a:defRPr>
+            </a:lvl6pPr>
+            <a:lvl7pPr marL="2743200" algn="l" defTabSz="914400" rtl="0" eaLnBrk="1" latinLnBrk="0" hangingPunct="1">
+              <a:defRPr sz="1800" kern="1200">
+                <a:solidFill>
+                  <a:schemeClr val="lt1"/>
+                </a:solidFill>
+                <a:latin typeface="+mn-lt"/>
+                <a:ea typeface="+mn-ea"/>
+                <a:cs typeface="+mn-cs"/>
+              </a:defRPr>
+            </a:lvl7pPr>
+            <a:lvl8pPr marL="3200400" algn="l" defTabSz="914400" rtl="0" eaLnBrk="1" latinLnBrk="0" hangingPunct="1">
+              <a:defRPr sz="1800" kern="1200">
+                <a:solidFill>
+                  <a:schemeClr val="lt1"/>
+                </a:solidFill>
+                <a:latin typeface="+mn-lt"/>
+                <a:ea typeface="+mn-ea"/>
+                <a:cs typeface="+mn-cs"/>
+              </a:defRPr>
+            </a:lvl8pPr>
+            <a:lvl9pPr marL="3657600" algn="l" defTabSz="914400" rtl="0" eaLnBrk="1" latinLnBrk="0" hangingPunct="1">
+              <a:defRPr sz="1800" kern="1200">
+                <a:solidFill>
+                  <a:schemeClr val="lt1"/>
+                </a:solidFill>
+                <a:latin typeface="+mn-lt"/>
+                <a:ea typeface="+mn-ea"/>
+                <a:cs typeface="+mn-cs"/>
+              </a:defRPr>
+            </a:lvl9pPr>
+          </a:lstStyle>
+          <a:p>
+            <a:pPr algn="ctr"/>
+            <a:endParaRPr lang="LID4096"/>
+          </a:p>
+        </p:txBody>
+      </p:sp>
+      <p:sp>
+        <p:nvSpPr>
+          <p:cNvPr id="4" name="Isosceles Triangle 3">
+            <a:extLst>
+              <a:ext uri="{FF2B5EF4-FFF2-40B4-BE49-F238E27FC236}">
+                <a16:creationId xmlns:a16="http://schemas.microsoft.com/office/drawing/2014/main" id="{1E092BBE-7E09-4F3D-BC2D-905C49F1A534}"/>
+              </a:ext>
+            </a:extLst>
+          </p:cNvPr>
+          <p:cNvSpPr/>
+          <p:nvPr/>
+        </p:nvSpPr>
+        <p:spPr>
+          <a:xfrm>
+            <a:off x="1371599" y="1069676"/>
             <a:ext cx="1958196" cy="1915063"/>
           </a:xfrm>
           <a:prstGeom prst="triangle">
@@ -6089,10 +6244,10 @@
       </p:sp>
       <p:sp>
         <p:nvSpPr>
-          <p:cNvPr id="7" name="Oval 6">
-            <a:extLst>
-              <a:ext uri="{FF2B5EF4-FFF2-40B4-BE49-F238E27FC236}">
-                <a16:creationId xmlns:a16="http://schemas.microsoft.com/office/drawing/2014/main" id="{7F8D11B8-FA0D-471C-9F07-CF11310F081C}"/>
+          <p:cNvPr id="10" name="Multiplication Sign 9">
+            <a:extLst>
+              <a:ext uri="{FF2B5EF4-FFF2-40B4-BE49-F238E27FC236}">
+                <a16:creationId xmlns:a16="http://schemas.microsoft.com/office/drawing/2014/main" id="{C8C22A79-15BB-EB26-A597-FB4A196D1427}"/>
               </a:ext>
             </a:extLst>
           </p:cNvPr>
@@ -6101,18 +6256,22 @@
         </p:nvSpPr>
         <p:spPr>
           <a:xfrm>
-            <a:off x="5138468" y="4157933"/>
-            <a:ext cx="1915063" cy="1915063"/>
-          </a:xfrm>
-          <a:prstGeom prst="ellipse">
+            <a:off x="4607415" y="3275000"/>
+            <a:ext cx="2977169" cy="2694013"/>
+          </a:xfrm>
+          <a:prstGeom prst="mathMultiply">
             <a:avLst/>
           </a:prstGeom>
           <a:solidFill>
-            <a:srgbClr val="00B050"/>
+            <a:schemeClr val="accent4">
+              <a:lumMod val="75000"/>
+            </a:schemeClr>
           </a:solidFill>
           <a:ln>
             <a:solidFill>
-              <a:srgbClr val="00B050"/>
+              <a:schemeClr val="accent4">
+                <a:lumMod val="75000"/>
+              </a:schemeClr>
             </a:solidFill>
           </a:ln>
         </p:spPr>
@@ -6141,62 +6300,10 @@
           </a:p>
         </p:txBody>
       </p:sp>
-      <p:sp>
-        <p:nvSpPr>
-          <p:cNvPr id="2" name="Rectangle 1">
-            <a:extLst>
-              <a:ext uri="{FF2B5EF4-FFF2-40B4-BE49-F238E27FC236}">
-                <a16:creationId xmlns:a16="http://schemas.microsoft.com/office/drawing/2014/main" id="{FE756012-084D-440E-ACB3-BED6D1348117}"/>
-              </a:ext>
-            </a:extLst>
-          </p:cNvPr>
-          <p:cNvSpPr/>
-          <p:nvPr/>
-        </p:nvSpPr>
-        <p:spPr>
-          <a:xfrm>
-            <a:off x="4702833" y="3916392"/>
-            <a:ext cx="2786332" cy="2398143"/>
-          </a:xfrm>
-          <a:prstGeom prst="rect">
-            <a:avLst/>
-          </a:prstGeom>
-          <a:noFill/>
-          <a:ln w="57150">
-            <a:solidFill>
-              <a:srgbClr val="FFFF00"/>
-            </a:solidFill>
-          </a:ln>
-        </p:spPr>
-        <p:style>
-          <a:lnRef idx="2">
-            <a:schemeClr val="accent1">
-              <a:shade val="50000"/>
-            </a:schemeClr>
-          </a:lnRef>
-          <a:fillRef idx="1">
-            <a:schemeClr val="accent1"/>
-          </a:fillRef>
-          <a:effectRef idx="0">
-            <a:schemeClr val="accent1"/>
-          </a:effectRef>
-          <a:fontRef idx="minor">
-            <a:schemeClr val="lt1"/>
-          </a:fontRef>
-        </p:style>
-        <p:txBody>
-          <a:bodyPr rtlCol="0" anchor="ctr"/>
-          <a:lstStyle/>
-          <a:p>
-            <a:pPr algn="ctr"/>
-            <a:endParaRPr lang="LID4096"/>
-          </a:p>
-        </p:txBody>
-      </p:sp>
     </p:spTree>
     <p:extLst>
       <p:ext uri="{BB962C8B-B14F-4D97-AF65-F5344CB8AC3E}">
-        <p14:creationId xmlns:p14="http://schemas.microsoft.com/office/powerpoint/2010/main" val="2277762598"/>
+        <p14:creationId xmlns:p14="http://schemas.microsoft.com/office/powerpoint/2010/main" val="1322457670"/>
       </p:ext>
     </p:extLst>
   </p:cSld>

</xml_diff>

<commit_message>
update default to 2 classes & fix 2 classes images
</commit_message>
<xml_diff>
--- a/P300/TriggersBank/visual tirggers.pptx
+++ b/P300/TriggersBank/visual tirggers.pptx
@@ -7,8 +7,8 @@
   <p:sldIdLst>
     <p:sldId id="256" r:id="rId2"/>
     <p:sldId id="276" r:id="rId3"/>
-    <p:sldId id="279" r:id="rId4"/>
-    <p:sldId id="280" r:id="rId5"/>
+    <p:sldId id="277" r:id="rId4"/>
+    <p:sldId id="278" r:id="rId5"/>
     <p:sldId id="260" r:id="rId6"/>
     <p:sldId id="261" r:id="rId7"/>
     <p:sldId id="263" r:id="rId8"/>
@@ -129,8 +129,8 @@
           <p14:sldIdLst>
             <p14:sldId id="256"/>
             <p14:sldId id="276"/>
-            <p14:sldId id="279"/>
-            <p14:sldId id="280"/>
+            <p14:sldId id="277"/>
+            <p14:sldId id="278"/>
           </p14:sldIdLst>
         </p14:section>
         <p14:section name="3 classes" id="{520DAD1B-CF64-4C86-B38A-1D948092B84C}">
@@ -5475,7 +5475,10 @@
     <p:bg>
       <p:bgPr>
         <a:solidFill>
-          <a:schemeClr val="tx1"/>
+          <a:schemeClr val="tx1">
+            <a:lumMod val="85000"/>
+            <a:lumOff val="15000"/>
+          </a:schemeClr>
         </a:solidFill>
         <a:effectLst/>
       </p:bgPr>
@@ -5499,7 +5502,7 @@
           <p:cNvPr id="5" name="Rectangle 4">
             <a:extLst>
               <a:ext uri="{FF2B5EF4-FFF2-40B4-BE49-F238E27FC236}">
-                <a16:creationId xmlns:a16="http://schemas.microsoft.com/office/drawing/2014/main" id="{D07C9ECF-729C-D5FF-A15A-0A890B1B9335}"/>
+                <a16:creationId xmlns:a16="http://schemas.microsoft.com/office/drawing/2014/main" id="{1F3AC257-FA6D-CA80-35A4-0085FDD2C190}"/>
               </a:ext>
             </a:extLst>
           </p:cNvPr>
@@ -5508,7 +5511,7 @@
         </p:nvSpPr>
         <p:spPr>
           <a:xfrm>
-            <a:off x="4461294" y="3215046"/>
+            <a:off x="4461294" y="3155094"/>
             <a:ext cx="3269410" cy="2813919"/>
           </a:xfrm>
           <a:prstGeom prst="rect">
@@ -5709,7 +5712,7 @@
     </p:spTree>
     <p:extLst>
       <p:ext uri="{BB962C8B-B14F-4D97-AF65-F5344CB8AC3E}">
-        <p14:creationId xmlns:p14="http://schemas.microsoft.com/office/powerpoint/2010/main" val="2166946610"/>
+        <p14:creationId xmlns:p14="http://schemas.microsoft.com/office/powerpoint/2010/main" val="2791205379"/>
       </p:ext>
     </p:extLst>
   </p:cSld>
@@ -5725,7 +5728,10 @@
     <p:bg>
       <p:bgPr>
         <a:solidFill>
-          <a:schemeClr val="tx1"/>
+          <a:schemeClr val="tx1">
+            <a:lumMod val="85000"/>
+            <a:lumOff val="15000"/>
+          </a:schemeClr>
         </a:solidFill>
         <a:effectLst/>
       </p:bgPr>
@@ -5749,7 +5755,7 @@
           <p:cNvPr id="5" name="Rectangle 4">
             <a:extLst>
               <a:ext uri="{FF2B5EF4-FFF2-40B4-BE49-F238E27FC236}">
-                <a16:creationId xmlns:a16="http://schemas.microsoft.com/office/drawing/2014/main" id="{1691581E-A07D-6023-9B22-B3CB70B946BD}"/>
+                <a16:creationId xmlns:a16="http://schemas.microsoft.com/office/drawing/2014/main" id="{7AAA1EA1-EFB3-D5C0-6296-6D3EBCB6446E}"/>
               </a:ext>
             </a:extLst>
           </p:cNvPr>
@@ -5758,7 +5764,7 @@
         </p:nvSpPr>
         <p:spPr>
           <a:xfrm>
-            <a:off x="8285674" y="620247"/>
+            <a:off x="8285674" y="680350"/>
             <a:ext cx="3269410" cy="2813919"/>
           </a:xfrm>
           <a:prstGeom prst="rect">
@@ -5959,7 +5965,7 @@
     </p:spTree>
     <p:extLst>
       <p:ext uri="{BB962C8B-B14F-4D97-AF65-F5344CB8AC3E}">
-        <p14:creationId xmlns:p14="http://schemas.microsoft.com/office/powerpoint/2010/main" val="3067732529"/>
+        <p14:creationId xmlns:p14="http://schemas.microsoft.com/office/powerpoint/2010/main" val="4166096152"/>
       </p:ext>
     </p:extLst>
   </p:cSld>
@@ -5975,7 +5981,10 @@
     <p:bg>
       <p:bgPr>
         <a:solidFill>
-          <a:schemeClr val="tx1"/>
+          <a:schemeClr val="tx1">
+            <a:lumMod val="85000"/>
+            <a:lumOff val="15000"/>
+          </a:schemeClr>
         </a:solidFill>
         <a:effectLst/>
       </p:bgPr>
@@ -5999,7 +6008,7 @@
           <p:cNvPr id="5" name="Rectangle 4">
             <a:extLst>
               <a:ext uri="{FF2B5EF4-FFF2-40B4-BE49-F238E27FC236}">
-                <a16:creationId xmlns:a16="http://schemas.microsoft.com/office/drawing/2014/main" id="{D07C9ECF-729C-D5FF-A15A-0A890B1B9335}"/>
+                <a16:creationId xmlns:a16="http://schemas.microsoft.com/office/drawing/2014/main" id="{6843EF86-ED4C-DC04-D613-C962425E85F8}"/>
               </a:ext>
             </a:extLst>
           </p:cNvPr>
@@ -6008,7 +6017,7 @@
         </p:nvSpPr>
         <p:spPr>
           <a:xfrm>
-            <a:off x="715992" y="771739"/>
+            <a:off x="715992" y="680350"/>
             <a:ext cx="3269410" cy="2813919"/>
           </a:xfrm>
           <a:prstGeom prst="rect">
@@ -6041,101 +6050,7 @@
         </p:style>
         <p:txBody>
           <a:bodyPr rtlCol="0" anchor="ctr"/>
-          <a:lstStyle>
-            <a:defPPr>
-              <a:defRPr lang="LID4096"/>
-            </a:defPPr>
-            <a:lvl1pPr marL="0" algn="l" defTabSz="914400" rtl="0" eaLnBrk="1" latinLnBrk="0" hangingPunct="1">
-              <a:defRPr sz="1800" kern="1200">
-                <a:solidFill>
-                  <a:schemeClr val="lt1"/>
-                </a:solidFill>
-                <a:latin typeface="+mn-lt"/>
-                <a:ea typeface="+mn-ea"/>
-                <a:cs typeface="+mn-cs"/>
-              </a:defRPr>
-            </a:lvl1pPr>
-            <a:lvl2pPr marL="457200" algn="l" defTabSz="914400" rtl="0" eaLnBrk="1" latinLnBrk="0" hangingPunct="1">
-              <a:defRPr sz="1800" kern="1200">
-                <a:solidFill>
-                  <a:schemeClr val="lt1"/>
-                </a:solidFill>
-                <a:latin typeface="+mn-lt"/>
-                <a:ea typeface="+mn-ea"/>
-                <a:cs typeface="+mn-cs"/>
-              </a:defRPr>
-            </a:lvl2pPr>
-            <a:lvl3pPr marL="914400" algn="l" defTabSz="914400" rtl="0" eaLnBrk="1" latinLnBrk="0" hangingPunct="1">
-              <a:defRPr sz="1800" kern="1200">
-                <a:solidFill>
-                  <a:schemeClr val="lt1"/>
-                </a:solidFill>
-                <a:latin typeface="+mn-lt"/>
-                <a:ea typeface="+mn-ea"/>
-                <a:cs typeface="+mn-cs"/>
-              </a:defRPr>
-            </a:lvl3pPr>
-            <a:lvl4pPr marL="1371600" algn="l" defTabSz="914400" rtl="0" eaLnBrk="1" latinLnBrk="0" hangingPunct="1">
-              <a:defRPr sz="1800" kern="1200">
-                <a:solidFill>
-                  <a:schemeClr val="lt1"/>
-                </a:solidFill>
-                <a:latin typeface="+mn-lt"/>
-                <a:ea typeface="+mn-ea"/>
-                <a:cs typeface="+mn-cs"/>
-              </a:defRPr>
-            </a:lvl4pPr>
-            <a:lvl5pPr marL="1828800" algn="l" defTabSz="914400" rtl="0" eaLnBrk="1" latinLnBrk="0" hangingPunct="1">
-              <a:defRPr sz="1800" kern="1200">
-                <a:solidFill>
-                  <a:schemeClr val="lt1"/>
-                </a:solidFill>
-                <a:latin typeface="+mn-lt"/>
-                <a:ea typeface="+mn-ea"/>
-                <a:cs typeface="+mn-cs"/>
-              </a:defRPr>
-            </a:lvl5pPr>
-            <a:lvl6pPr marL="2286000" algn="l" defTabSz="914400" rtl="0" eaLnBrk="1" latinLnBrk="0" hangingPunct="1">
-              <a:defRPr sz="1800" kern="1200">
-                <a:solidFill>
-                  <a:schemeClr val="lt1"/>
-                </a:solidFill>
-                <a:latin typeface="+mn-lt"/>
-                <a:ea typeface="+mn-ea"/>
-                <a:cs typeface="+mn-cs"/>
-              </a:defRPr>
-            </a:lvl6pPr>
-            <a:lvl7pPr marL="2743200" algn="l" defTabSz="914400" rtl="0" eaLnBrk="1" latinLnBrk="0" hangingPunct="1">
-              <a:defRPr sz="1800" kern="1200">
-                <a:solidFill>
-                  <a:schemeClr val="lt1"/>
-                </a:solidFill>
-                <a:latin typeface="+mn-lt"/>
-                <a:ea typeface="+mn-ea"/>
-                <a:cs typeface="+mn-cs"/>
-              </a:defRPr>
-            </a:lvl7pPr>
-            <a:lvl8pPr marL="3200400" algn="l" defTabSz="914400" rtl="0" eaLnBrk="1" latinLnBrk="0" hangingPunct="1">
-              <a:defRPr sz="1800" kern="1200">
-                <a:solidFill>
-                  <a:schemeClr val="lt1"/>
-                </a:solidFill>
-                <a:latin typeface="+mn-lt"/>
-                <a:ea typeface="+mn-ea"/>
-                <a:cs typeface="+mn-cs"/>
-              </a:defRPr>
-            </a:lvl8pPr>
-            <a:lvl9pPr marL="3657600" algn="l" defTabSz="914400" rtl="0" eaLnBrk="1" latinLnBrk="0" hangingPunct="1">
-              <a:defRPr sz="1800" kern="1200">
-                <a:solidFill>
-                  <a:schemeClr val="lt1"/>
-                </a:solidFill>
-                <a:latin typeface="+mn-lt"/>
-                <a:ea typeface="+mn-ea"/>
-                <a:cs typeface="+mn-cs"/>
-              </a:defRPr>
-            </a:lvl9pPr>
-          </a:lstStyle>
+          <a:lstStyle/>
           <a:p>
             <a:pPr algn="ctr"/>
             <a:endParaRPr lang="LID4096"/>
@@ -6303,7 +6218,7 @@
     </p:spTree>
     <p:extLst>
       <p:ext uri="{BB962C8B-B14F-4D97-AF65-F5344CB8AC3E}">
-        <p14:creationId xmlns:p14="http://schemas.microsoft.com/office/powerpoint/2010/main" val="1322457670"/>
+        <p14:creationId xmlns:p14="http://schemas.microsoft.com/office/powerpoint/2010/main" val="638256942"/>
       </p:ext>
     </p:extLst>
   </p:cSld>

</xml_diff>